<commit_message>
Updated version of the DoP Presentation. Conciseness, comments.
</commit_message>
<xml_diff>
--- a/doc/demonstration_of_progress/ABSOL.pptx
+++ b/doc/demonstration_of_progress/ABSOL.pptx
@@ -206,7 +206,7 @@
           <a:p>
             <a:fld id="{4CCF3108-EE2E-48AF-9654-6811B44FAC5C}" type="datetimeFigureOut">
               <a:rPr lang="en-GB" smtClean="0"/>
-              <a:t>13/02/2017</a:t>
+              <a:t>14/02/2017</a:t>
             </a:fld>
             <a:endParaRPr lang="en-GB"/>
           </a:p>
@@ -518,212 +518,23 @@
           <a:bodyPr/>
           <a:lstStyle/>
           <a:p>
-            <a:pPr marL="171450" indent="-171450">
-              <a:buFontTx/>
-              <a:buChar char="-"/>
-            </a:pPr>
-            <a:r>
-              <a:rPr lang="en-GB" dirty="0"/>
-              <a:t>Modern software systems are increasing significantly in complexity</a:t>
-            </a:r>
-          </a:p>
-          <a:p>
-            <a:pPr marL="171450" indent="-171450">
-              <a:buFontTx/>
-              <a:buChar char="-"/>
-            </a:pPr>
-            <a:r>
-              <a:rPr lang="en-GB" dirty="0"/>
-              <a:t>As the complexity of these systems grows, it is becoming apparent that domain-specific logic is becoming integrated in many forms throughout these systems</a:t>
-            </a:r>
-          </a:p>
-          <a:p>
-            <a:pPr marL="171450" indent="-171450">
-              <a:buFontTx/>
-              <a:buChar char="-"/>
-            </a:pPr>
+            <a:r>
+              <a:rPr lang="en-GB" dirty="0" err="1"/>
+              <a:t>Heya</a:t>
+            </a:r>
+            <a:r>
+              <a:rPr lang="en-GB" dirty="0"/>
+              <a:t>!</a:t>
+            </a:r>
+          </a:p>
+          <a:p>
             <a:endParaRPr lang="en-GB" dirty="0"/>
           </a:p>
           <a:p>
-            <a:pPr marL="171450" indent="-171450">
-              <a:buFontTx/>
-              <a:buChar char="-"/>
-            </a:pPr>
-            <a:r>
-              <a:rPr lang="en-GB" dirty="0"/>
-              <a:t>Studies by Fowler and </a:t>
-            </a:r>
-            <a:r>
-              <a:rPr lang="en-GB" dirty="0" err="1"/>
-              <a:t>Mernik</a:t>
-            </a:r>
-            <a:r>
-              <a:rPr lang="en-GB" dirty="0"/>
-              <a:t>, amongst others, have demonstrated that this dispersion of domain logic throughout the system increases the risk of it being incorrect.</a:t>
-            </a:r>
-          </a:p>
-          <a:p>
-            <a:pPr marL="171450" indent="-171450">
-              <a:buFontTx/>
-              <a:buChar char="-"/>
-            </a:pPr>
-            <a:r>
-              <a:rPr lang="en-GB" dirty="0"/>
-              <a:t>As a result, there has been a “significant uptick in interest”  in Domain-Specific Languages or DSLs.</a:t>
-            </a:r>
-          </a:p>
-          <a:p>
-            <a:pPr marL="171450" indent="-171450">
-              <a:buFontTx/>
-              <a:buChar char="-"/>
-            </a:pPr>
-            <a:endParaRPr lang="en-GB" dirty="0"/>
-          </a:p>
-          <a:p>
-            <a:pPr marL="171450" indent="-171450">
-              <a:buFontTx/>
-              <a:buChar char="-"/>
-            </a:pPr>
-            <a:r>
-              <a:rPr lang="en-GB" dirty="0"/>
-              <a:t>The term DSL is a broad one, encompassing a multitude of embedded syntaxes for defining domain logic.</a:t>
-            </a:r>
-          </a:p>
-          <a:p>
-            <a:pPr marL="171450" indent="-171450">
-              <a:buFontTx/>
-              <a:buChar char="-"/>
-            </a:pPr>
-            <a:r>
-              <a:rPr lang="en-GB" dirty="0"/>
-              <a:t>These syntaxes may be integrated into the host language, or as an external API, and range from static configuration to sophisticated and executable programs</a:t>
-            </a:r>
-          </a:p>
-          <a:p>
-            <a:pPr marL="171450" indent="-171450">
-              <a:buFontTx/>
-              <a:buChar char="-"/>
-            </a:pPr>
-            <a:r>
-              <a:rPr lang="en-GB" dirty="0"/>
-              <a:t>The key notion is that the DSL is sufficient for specifying the required domain logic, and no more.</a:t>
-            </a:r>
-          </a:p>
-          <a:p>
-            <a:pPr marL="171450" indent="-171450">
-              <a:buFontTx/>
-              <a:buChar char="-"/>
-            </a:pPr>
-            <a:endParaRPr lang="en-GB" dirty="0"/>
-          </a:p>
-          <a:p>
-            <a:pPr marL="171450" indent="-171450">
-              <a:buFontTx/>
-              <a:buChar char="-"/>
-            </a:pPr>
-            <a:r>
-              <a:rPr lang="en-GB" dirty="0"/>
-              <a:t>The use of DSLs allows the domain logic in a program to be centralised in one place, and then accessed from other parts of the program.</a:t>
-            </a:r>
-          </a:p>
-          <a:p>
-            <a:pPr marL="171450" indent="-171450">
-              <a:buFontTx/>
-              <a:buChar char="-"/>
-            </a:pPr>
-            <a:r>
-              <a:rPr lang="en-GB" dirty="0"/>
-              <a:t>This means that there is only one place in which domain logic has to be changed.</a:t>
-            </a:r>
-          </a:p>
-          <a:p>
-            <a:pPr marL="171450" indent="-171450">
-              <a:buFontTx/>
-              <a:buChar char="-"/>
-            </a:pPr>
-            <a:endParaRPr lang="en-GB" dirty="0"/>
-          </a:p>
-          <a:p>
-            <a:pPr marL="171450" indent="-171450">
-              <a:buFontTx/>
-              <a:buChar char="-"/>
-            </a:pPr>
-            <a:r>
-              <a:rPr lang="en-GB" dirty="0"/>
-              <a:t>This project was inspired by observations from during my time at Bloomberg</a:t>
-            </a:r>
-          </a:p>
-          <a:p>
-            <a:pPr marL="171450" indent="-171450">
-              <a:buFontTx/>
-              <a:buChar char="-"/>
-            </a:pPr>
-            <a:r>
-              <a:rPr lang="en-GB" dirty="0"/>
-              <a:t>Certain projects within the company were using General Purpose programming languages for runtime configuration.</a:t>
-            </a:r>
-          </a:p>
-          <a:p>
-            <a:pPr marL="171450" indent="-171450">
-              <a:buFontTx/>
-              <a:buChar char="-"/>
-            </a:pPr>
-            <a:r>
-              <a:rPr lang="en-GB" dirty="0"/>
-              <a:t>This included the use of </a:t>
-            </a:r>
-            <a:r>
-              <a:rPr lang="en-GB" dirty="0" err="1"/>
-              <a:t>OCaml</a:t>
-            </a:r>
-            <a:r>
-              <a:rPr lang="en-GB" dirty="0"/>
-              <a:t> for specifying options pricing algorithms and trading strategies at runtime.</a:t>
-            </a:r>
-          </a:p>
-          <a:p>
-            <a:pPr marL="171450" indent="-171450">
-              <a:buFontTx/>
-              <a:buChar char="-"/>
-            </a:pPr>
-            <a:r>
-              <a:rPr lang="en-GB" dirty="0"/>
-              <a:t>However, these languages provided much more power than they needed, and hence an increased potential for system bugs</a:t>
-            </a:r>
-          </a:p>
-          <a:p>
-            <a:pPr marL="171450" indent="-171450">
-              <a:buFontTx/>
-              <a:buChar char="-"/>
-            </a:pPr>
-            <a:endParaRPr lang="en-GB" dirty="0"/>
-          </a:p>
-          <a:p>
-            <a:pPr marL="171450" indent="-171450">
-              <a:buFontTx/>
-              <a:buChar char="-"/>
-            </a:pPr>
-            <a:r>
-              <a:rPr lang="en-GB" dirty="0"/>
-              <a:t>However, as domain logic becomes centralised into DSLs, these small languages become single points-of-failure within the systems in which they are used.</a:t>
-            </a:r>
-          </a:p>
-          <a:p>
-            <a:pPr marL="171450" indent="-171450">
-              <a:buFontTx/>
-              <a:buChar char="-"/>
-            </a:pPr>
-            <a:r>
-              <a:rPr lang="en-GB" dirty="0"/>
-              <a:t>A bug in your domain logic, while simpler to find, will now have a much larger impact on the software system as a whole</a:t>
-            </a:r>
-          </a:p>
-          <a:p>
-            <a:pPr marL="171450" indent="-171450">
-              <a:buFontTx/>
-              <a:buChar char="-"/>
-            </a:pPr>
-            <a:endParaRPr lang="en-GB" dirty="0"/>
+            <a:r>
+              <a:rPr lang="en-GB" dirty="0"/>
+              <a:t>Today I’m going to give you a brief overview of my project: ABSOL, the Automatic Builder for Semantically Oriented Languages.</a:t>
+            </a:r>
           </a:p>
         </p:txBody>
       </p:sp>
@@ -744,7 +555,7 @@
           <a:p>
             <a:fld id="{F5F7E2F0-36DF-4539-BA6A-BB9F44EE2545}" type="slidenum">
               <a:rPr lang="en-GB" smtClean="0"/>
-              <a:t>2</a:t>
+              <a:t>1</a:t>
             </a:fld>
             <a:endParaRPr lang="en-GB"/>
           </a:p>
@@ -753,7 +564,94 @@
     </p:spTree>
     <p:extLst>
       <p:ext uri="{BB962C8B-B14F-4D97-AF65-F5344CB8AC3E}">
-        <p14:creationId xmlns:p14="http://schemas.microsoft.com/office/powerpoint/2010/main" val="3160601930"/>
+        <p14:creationId xmlns:p14="http://schemas.microsoft.com/office/powerpoint/2010/main" val="3578247770"/>
+      </p:ext>
+    </p:extLst>
+  </p:cSld>
+  <p:clrMapOvr>
+    <a:masterClrMapping/>
+  </p:clrMapOvr>
+</p:notes>
+</file>
+
+<file path=ppt/notesSlides/notesSlide10.xml><?xml version="1.0" encoding="utf-8"?>
+<p:notes xmlns:a="http://schemas.openxmlformats.org/drawingml/2006/main" xmlns:r="http://schemas.openxmlformats.org/officeDocument/2006/relationships" xmlns:p="http://schemas.openxmlformats.org/presentationml/2006/main">
+  <p:cSld>
+    <p:spTree>
+      <p:nvGrpSpPr>
+        <p:cNvPr id="1" name=""/>
+        <p:cNvGrpSpPr/>
+        <p:nvPr/>
+      </p:nvGrpSpPr>
+      <p:grpSpPr>
+        <a:xfrm>
+          <a:off x="0" y="0"/>
+          <a:ext cx="0" cy="0"/>
+          <a:chOff x="0" y="0"/>
+          <a:chExt cx="0" cy="0"/>
+        </a:xfrm>
+      </p:grpSpPr>
+      <p:sp>
+        <p:nvSpPr>
+          <p:cNvPr id="2" name="Slide Image Placeholder 1"/>
+          <p:cNvSpPr>
+            <a:spLocks noGrp="1" noRot="1" noChangeAspect="1"/>
+          </p:cNvSpPr>
+          <p:nvPr>
+            <p:ph type="sldImg"/>
+          </p:nvPr>
+        </p:nvSpPr>
+        <p:spPr/>
+      </p:sp>
+      <p:sp>
+        <p:nvSpPr>
+          <p:cNvPr id="3" name="Notes Placeholder 2"/>
+          <p:cNvSpPr>
+            <a:spLocks noGrp="1"/>
+          </p:cNvSpPr>
+          <p:nvPr>
+            <p:ph type="body" idx="1"/>
+          </p:nvPr>
+        </p:nvSpPr>
+        <p:spPr/>
+        <p:txBody>
+          <a:bodyPr/>
+          <a:lstStyle/>
+          <a:p>
+            <a:r>
+              <a:rPr lang="en-GB" dirty="0"/>
+              <a:t>Any questions?</a:t>
+            </a:r>
+          </a:p>
+        </p:txBody>
+      </p:sp>
+      <p:sp>
+        <p:nvSpPr>
+          <p:cNvPr id="4" name="Slide Number Placeholder 3"/>
+          <p:cNvSpPr>
+            <a:spLocks noGrp="1"/>
+          </p:cNvSpPr>
+          <p:nvPr>
+            <p:ph type="sldNum" sz="quarter" idx="10"/>
+          </p:nvPr>
+        </p:nvSpPr>
+        <p:spPr/>
+        <p:txBody>
+          <a:bodyPr/>
+          <a:lstStyle/>
+          <a:p>
+            <a:fld id="{F5F7E2F0-36DF-4539-BA6A-BB9F44EE2545}" type="slidenum">
+              <a:rPr lang="en-GB" smtClean="0"/>
+              <a:t>10</a:t>
+            </a:fld>
+            <a:endParaRPr lang="en-GB"/>
+          </a:p>
+        </p:txBody>
+      </p:sp>
+    </p:spTree>
+    <p:extLst>
+      <p:ext uri="{BB962C8B-B14F-4D97-AF65-F5344CB8AC3E}">
+        <p14:creationId xmlns:p14="http://schemas.microsoft.com/office/powerpoint/2010/main" val="786374633"/>
       </p:ext>
     </p:extLst>
   </p:cSld>
@@ -813,7 +711,7 @@
             </a:pPr>
             <a:r>
               <a:rPr lang="en-GB" dirty="0"/>
-              <a:t>This project aims to prevent the DSL from becoming such a critical failure point in the system through formally specifying its function. </a:t>
+              <a:t>In recent years, modern software systems have seen significant increases in complexity. </a:t>
             </a:r>
           </a:p>
           <a:p>
@@ -823,7 +721,7 @@
             </a:pPr>
             <a:r>
               <a:rPr lang="en-GB" dirty="0"/>
-              <a:t>Not only does this prevent certain classes of bug, it is easier to verify the semantics of a specification than an implementation.</a:t>
+              <a:t>As this complexity grows, it has become apparent that Domain-Specific Logic, trivially defined as logic pertaining to how the system operates in an environment, is becoming integrated into many portions of these systems.</a:t>
             </a:r>
           </a:p>
           <a:p>
@@ -833,35 +731,15 @@
             </a:pPr>
             <a:r>
               <a:rPr lang="en-GB" dirty="0"/>
-              <a:t>By fully specifying the DSL, the project aims to prevent common DSL errors, such as poor implementations leading to domain logic bugs, and programs that can diverge.</a:t>
-            </a:r>
-          </a:p>
-          <a:p>
-            <a:pPr marL="171450" indent="-171450">
-              <a:buFontTx/>
-              <a:buChar char="-"/>
-            </a:pPr>
-            <a:r>
-              <a:rPr lang="en-GB" dirty="0"/>
-              <a:t>Necessarily, being able to provide these guarantees requires the restriction of the types of programs that the DSL can represent. </a:t>
-            </a:r>
-          </a:p>
-          <a:p>
-            <a:pPr marL="171450" indent="-171450">
-              <a:buFontTx/>
-              <a:buChar char="-"/>
-            </a:pPr>
-            <a:r>
-              <a:rPr lang="en-GB" dirty="0"/>
-              <a:t>Doing so restricts the languages to operations on finite data (and hence no </a:t>
+              <a:t>However, studies by Fowler and </a:t>
             </a:r>
             <a:r>
               <a:rPr lang="en-GB" dirty="0" err="1"/>
-              <a:t>codata</a:t>
-            </a:r>
-            <a:r>
-              <a:rPr lang="en-GB" dirty="0"/>
-              <a:t>), and disallows the use of unbounded recursion.</a:t>
+              <a:t>Mernik</a:t>
+            </a:r>
+            <a:r>
+              <a:rPr lang="en-GB" dirty="0"/>
+              <a:t>, amongst others, have demonstrated that this dispersion of logic increases the risk of it being incorrect somewhere in the system.</a:t>
             </a:r>
           </a:p>
           <a:p>
@@ -878,42 +756,7 @@
             </a:pPr>
             <a:r>
               <a:rPr lang="en-GB" dirty="0"/>
-              <a:t>The system provides two main components.</a:t>
-            </a:r>
-          </a:p>
-          <a:p>
-            <a:pPr marL="171450" indent="-171450">
-              <a:buFontTx/>
-              <a:buChar char="-"/>
-            </a:pPr>
-            <a:r>
-              <a:rPr lang="en-GB" dirty="0"/>
-              <a:t>The first component is the Metalanguage: </a:t>
-            </a:r>
-            <a:r>
-              <a:rPr lang="en-GB" dirty="0" err="1"/>
-              <a:t>Metaspec</a:t>
-            </a:r>
-            <a:endParaRPr lang="en-GB" dirty="0"/>
-          </a:p>
-          <a:p>
-            <a:pPr marL="171450" indent="-171450">
-              <a:buFontTx/>
-              <a:buChar char="-"/>
-            </a:pPr>
-            <a:r>
-              <a:rPr lang="en-GB" dirty="0"/>
-              <a:t>This language provides facility to specify the syntax of the DSL, through an EBNF-variant grammar, and the semantics of each kind of syntactical statement.</a:t>
-            </a:r>
-          </a:p>
-          <a:p>
-            <a:pPr marL="171450" indent="-171450">
-              <a:buFontTx/>
-              <a:buChar char="-"/>
-            </a:pPr>
-            <a:r>
-              <a:rPr lang="en-GB" dirty="0"/>
-              <a:t>This coupling of syntax and semantics forces the DSL makers to carefully evaluate how they want their language to act.</a:t>
+              <a:t>As a result, there has been a “significant uptick in interest” in Domain-Specific Languages, or DSLs.</a:t>
             </a:r>
           </a:p>
           <a:p>
@@ -930,7 +773,7 @@
             </a:pPr>
             <a:r>
               <a:rPr lang="en-GB" dirty="0"/>
-              <a:t>The second component is the Metacompiler: ABSOL</a:t>
+              <a:t>The term ‘DSL’ is a broad one, and encompasses many syntaxes for defining domain logic. </a:t>
             </a:r>
           </a:p>
           <a:p>
@@ -940,15 +783,7 @@
             </a:pPr>
             <a:r>
               <a:rPr lang="en-GB" dirty="0"/>
-              <a:t>This is a software program that takes in a </a:t>
-            </a:r>
-            <a:r>
-              <a:rPr lang="en-GB" dirty="0" err="1"/>
-              <a:t>metaspec</a:t>
-            </a:r>
-            <a:r>
-              <a:rPr lang="en-GB" dirty="0"/>
-              <a:t> specification for a DSL x, and performs a couple of tasks.</a:t>
+              <a:t>These may be internal or external to the host language, and range from static configuration to sophisticated executable programs.</a:t>
             </a:r>
           </a:p>
           <a:p>
@@ -958,28 +793,17 @@
             </a:pPr>
             <a:r>
               <a:rPr lang="en-GB" dirty="0"/>
-              <a:t>The first is to verify that the semantics in the file are complete, meaning that all possible programs in x terminate.</a:t>
-            </a:r>
-          </a:p>
-          <a:p>
-            <a:pPr marL="171450" indent="-171450">
-              <a:buFontTx/>
-              <a:buChar char="-"/>
-            </a:pPr>
-            <a:r>
-              <a:rPr lang="en-GB" dirty="0"/>
-              <a:t>If the analysis phase passes, then the metacompiler will produce a compiler for x, embedding the provided semantic behaviour in the language compiler.</a:t>
-            </a:r>
-          </a:p>
-          <a:p>
-            <a:pPr marL="171450" indent="-171450">
-              <a:buFontTx/>
-              <a:buChar char="-"/>
-            </a:pPr>
-            <a:r>
-              <a:rPr lang="en-GB" dirty="0"/>
-              <a:t>This ensures that mistakes cannot be made in the language implementation that may alter the semantics of the language</a:t>
-            </a:r>
+              <a:t>DSLs specify the </a:t>
+            </a:r>
+            <a:r>
+              <a:rPr lang="en-GB" i="1" dirty="0"/>
+              <a:t>required</a:t>
+            </a:r>
+            <a:r>
+              <a:rPr lang="en-GB" i="0" dirty="0"/>
+              <a:t> domain logic, and no more. </a:t>
+            </a:r>
+            <a:endParaRPr lang="en-GB" dirty="0"/>
           </a:p>
           <a:p>
             <a:pPr marL="171450" indent="-171450">
@@ -995,7 +819,72 @@
             </a:pPr>
             <a:r>
               <a:rPr lang="en-GB" dirty="0"/>
-              <a:t>Combined, these two elements of the system should provide for the creation of provably correct DSLs.</a:t>
+              <a:t>The use of DSLs allows for the centralisation of this domain logic, ensuring that there is only one place where it needs to be changed.</a:t>
+            </a:r>
+          </a:p>
+          <a:p>
+            <a:pPr marL="171450" indent="-171450">
+              <a:buFontTx/>
+              <a:buChar char="-"/>
+            </a:pPr>
+            <a:r>
+              <a:rPr lang="en-GB" dirty="0"/>
+              <a:t>However, as domain logic becomes centralised, this creates a single-point-of-failure within the system in which the DSL is used.</a:t>
+            </a:r>
+          </a:p>
+          <a:p>
+            <a:pPr marL="171450" indent="-171450">
+              <a:buFontTx/>
+              <a:buChar char="-"/>
+            </a:pPr>
+            <a:r>
+              <a:rPr lang="en-GB" dirty="0"/>
+              <a:t>A bug in your domain logic, while simpler to find, now has a greater impact. </a:t>
+            </a:r>
+          </a:p>
+          <a:p>
+            <a:pPr marL="171450" indent="-171450">
+              <a:buFontTx/>
+              <a:buChar char="-"/>
+            </a:pPr>
+            <a:endParaRPr lang="en-GB" dirty="0"/>
+          </a:p>
+          <a:p>
+            <a:pPr marL="171450" indent="-171450">
+              <a:buFontTx/>
+              <a:buChar char="-"/>
+            </a:pPr>
+            <a:r>
+              <a:rPr lang="en-GB" dirty="0"/>
+              <a:t>This project was inspired by my time at Bloomberg, where I observed certain projects in the company to be using General-Purpose Programming languages (GPLs) for runtime configuration.</a:t>
+            </a:r>
+          </a:p>
+          <a:p>
+            <a:pPr marL="171450" indent="-171450">
+              <a:buFontTx/>
+              <a:buChar char="-"/>
+            </a:pPr>
+            <a:r>
+              <a:rPr lang="en-GB" dirty="0"/>
+              <a:t>This included the use of </a:t>
+            </a:r>
+            <a:r>
+              <a:rPr lang="en-GB" dirty="0" err="1"/>
+              <a:t>OCaml</a:t>
+            </a:r>
+            <a:r>
+              <a:rPr lang="en-GB" dirty="0"/>
+              <a:t> for specifying options pricing algorithms and trading strategies at runtime. </a:t>
+            </a:r>
+          </a:p>
+          <a:p>
+            <a:pPr marL="171450" indent="-171450">
+              <a:buFontTx/>
+              <a:buChar char="-"/>
+            </a:pPr>
+            <a:r>
+              <a:rPr lang="en-GB" dirty="0"/>
+              <a:t>These languages provided much more power than required, increasing the potential for system bugs. </a:t>
             </a:r>
           </a:p>
         </p:txBody>
@@ -1017,7 +906,7 @@
           <a:p>
             <a:fld id="{F5F7E2F0-36DF-4539-BA6A-BB9F44EE2545}" type="slidenum">
               <a:rPr lang="en-GB" smtClean="0"/>
-              <a:t>3</a:t>
+              <a:t>2</a:t>
             </a:fld>
             <a:endParaRPr lang="en-GB"/>
           </a:p>
@@ -1026,7 +915,7 @@
     </p:spTree>
     <p:extLst>
       <p:ext uri="{BB962C8B-B14F-4D97-AF65-F5344CB8AC3E}">
-        <p14:creationId xmlns:p14="http://schemas.microsoft.com/office/powerpoint/2010/main" val="114286306"/>
+        <p14:creationId xmlns:p14="http://schemas.microsoft.com/office/powerpoint/2010/main" val="3160601930"/>
       </p:ext>
     </p:extLst>
   </p:cSld>
@@ -1086,7 +975,7 @@
             </a:pPr>
             <a:r>
               <a:rPr lang="en-GB" dirty="0"/>
-              <a:t>While many areas in which a DSL is employed could also use a General-Purpose Programming Language most DSL proponents find that they provide a more appropriate level of abstraction for a given problem domain.</a:t>
+              <a:t>This project is concerned with preventing the DSL from becoming such a critical failure point through formal specification. </a:t>
             </a:r>
           </a:p>
           <a:p>
@@ -1096,7 +985,17 @@
             </a:pPr>
             <a:r>
               <a:rPr lang="en-GB" dirty="0"/>
-              <a:t>They allow for encoding important business logic that may be orthogonal to the GPLs in which the business software is written.</a:t>
+              <a:t>Not only does doing so prevent certain classes of bug, the formal semantic specification is far easier to verify than the semantics of an implementation.</a:t>
+            </a:r>
+          </a:p>
+          <a:p>
+            <a:pPr marL="171450" indent="-171450">
+              <a:buFontTx/>
+              <a:buChar char="-"/>
+            </a:pPr>
+            <a:r>
+              <a:rPr lang="en-GB" dirty="0"/>
+              <a:t>Full specification of the DSL aims to prevent common errors, such as poor implementations, and divergent programs. </a:t>
             </a:r>
           </a:p>
           <a:p>
@@ -1113,7 +1012,7 @@
             </a:pPr>
             <a:r>
               <a:rPr lang="en-GB" dirty="0"/>
-              <a:t>While there are many kinds of DSL in use, ranging from static specification languages (often a better replacement for XML or JSON), to fully-executable programming languages, this project focuses on any kind of DSL that has execution semantics.</a:t>
+              <a:t>Necessarily, however, being able to provide these guarantees necessitates restriction of the types of programs that these languages can represent.</a:t>
             </a:r>
           </a:p>
           <a:p>
@@ -1123,7 +1022,7 @@
             </a:pPr>
             <a:r>
               <a:rPr lang="en-GB" dirty="0"/>
-              <a:t>It also focuses on what multiple pieces of literature term ‘external’ DSLs. These are those which are not an extension of the host language, but exist on their own and are integrated with other languages via a Foreign-Function Interface.</a:t>
+              <a:t>While this would be an unreasonable restriction for a GPL, in the world of DSLs it is far less limiting.</a:t>
             </a:r>
           </a:p>
           <a:p>
@@ -1133,25 +1032,7 @@
             </a:pPr>
             <a:r>
               <a:rPr lang="en-GB" dirty="0"/>
-              <a:t>This choice reflects the desire of the project to have maximum control over the DSL execution environment. </a:t>
-            </a:r>
-          </a:p>
-          <a:p>
-            <a:pPr marL="171450" indent="-171450">
-              <a:buFontTx/>
-              <a:buChar char="-"/>
-            </a:pPr>
-            <a:r>
-              <a:rPr lang="en-GB" dirty="0"/>
-              <a:t>In order to maintain this control, the DSL will be generated via </a:t>
-            </a:r>
-            <a:r>
-              <a:rPr lang="en-GB" dirty="0" err="1"/>
-              <a:t>transpilation</a:t>
-            </a:r>
-            <a:r>
-              <a:rPr lang="en-GB" dirty="0"/>
-              <a:t> to Haskell, a form of compilation that targets another high-level language. While compilation to ASM and interpreter approaches were recorded in the literature, it was determined that this would provide the most appropriate trade-off.</a:t>
+              <a:t>By restricting the DSLs to operations on finite data and disallowing the use of unbounded recursion, it is possible to prove the DSL correct.</a:t>
             </a:r>
           </a:p>
           <a:p>
@@ -1168,17 +1049,7 @@
             </a:pPr>
             <a:r>
               <a:rPr lang="en-GB" dirty="0"/>
-              <a:t>Metalanguages are languages used to describe aspects of language, and for this project an investigation into methods of specifying both syntax and semantics was required.</a:t>
-            </a:r>
-          </a:p>
-          <a:p>
-            <a:pPr marL="171450" indent="-171450">
-              <a:buFontTx/>
-              <a:buChar char="-"/>
-            </a:pPr>
-            <a:r>
-              <a:rPr lang="en-GB" dirty="0"/>
-              <a:t>While formal definitions of languages fall into multiple categories: unrestricted, context-sensitive, context-free and regular, this project focused on the use of Extended Backus-Naur form notation for specifying language syntax. This is because it provides multiple extension mechanisms for integrating additional language features. </a:t>
+              <a:t>The system has two main components</a:t>
             </a:r>
           </a:p>
           <a:p>
@@ -1195,7 +1066,15 @@
             </a:pPr>
             <a:r>
               <a:rPr lang="en-GB" dirty="0"/>
-              <a:t>In contrast to the established standard for specifying syntax, the specification of semantics is a much broader category of work, but all different methods consist of semantic functions: mappings from the abstract syntax of a program to its behaviour.</a:t>
+              <a:t>The first is </a:t>
+            </a:r>
+            <a:r>
+              <a:rPr lang="en-GB" dirty="0" err="1"/>
+              <a:t>Metaspec</a:t>
+            </a:r>
+            <a:r>
+              <a:rPr lang="en-GB" dirty="0"/>
+              <a:t>, the metalanguage.</a:t>
             </a:r>
           </a:p>
           <a:p>
@@ -1205,7 +1084,15 @@
             </a:pPr>
             <a:r>
               <a:rPr lang="en-GB" dirty="0"/>
-              <a:t>While the review process involved investigating operational, denotational, axiomatic and hybrid semantics, it was decided that the big-step form of operational semantics provided the best balance between conciseness and expression. The recursive nature of the semantics has proved key in the mechanisms for proving program correctness.</a:t>
+              <a:t>This allows the specification of the syntax </a:t>
+            </a:r>
+            <a:r>
+              <a:rPr lang="en-GB" i="1" dirty="0"/>
+              <a:t>and</a:t>
+            </a:r>
+            <a:r>
+              <a:rPr lang="en-GB" i="0" dirty="0"/>
+              <a:t> semantics of the DSL, and in doing so forces the DSL creators to carefully evaluate how they want their language to behave.</a:t>
             </a:r>
           </a:p>
           <a:p>
@@ -1213,6 +1100,54 @@
               <a:buFontTx/>
               <a:buChar char="-"/>
             </a:pPr>
+            <a:endParaRPr lang="en-GB" i="0" dirty="0"/>
+          </a:p>
+          <a:p>
+            <a:pPr marL="171450" indent="-171450">
+              <a:buFontTx/>
+              <a:buChar char="-"/>
+            </a:pPr>
+            <a:r>
+              <a:rPr lang="en-GB" i="0" dirty="0"/>
+              <a:t>The second component is ABSOL, the metacompiler.</a:t>
+            </a:r>
+          </a:p>
+          <a:p>
+            <a:pPr marL="171450" indent="-171450">
+              <a:buFontTx/>
+              <a:buChar char="-"/>
+            </a:pPr>
+            <a:r>
+              <a:rPr lang="en-GB" i="0" dirty="0"/>
+              <a:t>It is a software program that ingests a specification for a DSL x, verifies the semantics of x (meaning that all programs in x terminate), and then produces a compiler for the language x.</a:t>
+            </a:r>
+          </a:p>
+          <a:p>
+            <a:pPr marL="171450" indent="-171450">
+              <a:buFontTx/>
+              <a:buChar char="-"/>
+            </a:pPr>
+            <a:r>
+              <a:rPr lang="en-GB" i="0" dirty="0"/>
+              <a:t>This ensures that mistakes cannot be made in the implementation of the DSL, and thus ensures correct language semantics. </a:t>
+            </a:r>
+          </a:p>
+          <a:p>
+            <a:pPr marL="171450" indent="-171450">
+              <a:buFontTx/>
+              <a:buChar char="-"/>
+            </a:pPr>
+            <a:endParaRPr lang="en-GB" i="0" dirty="0"/>
+          </a:p>
+          <a:p>
+            <a:pPr marL="171450" indent="-171450">
+              <a:buFontTx/>
+              <a:buChar char="-"/>
+            </a:pPr>
+            <a:r>
+              <a:rPr lang="en-GB" i="0" dirty="0"/>
+              <a:t>Combined, these two elements of the system should provide for the creation of provably correct DSLs.</a:t>
+            </a:r>
             <a:endParaRPr lang="en-GB" dirty="0"/>
           </a:p>
         </p:txBody>
@@ -1234,7 +1169,7 @@
           <a:p>
             <a:fld id="{F5F7E2F0-36DF-4539-BA6A-BB9F44EE2545}" type="slidenum">
               <a:rPr lang="en-GB" smtClean="0"/>
-              <a:t>4</a:t>
+              <a:t>3</a:t>
             </a:fld>
             <a:endParaRPr lang="en-GB"/>
           </a:p>
@@ -1243,7 +1178,7 @@
     </p:spTree>
     <p:extLst>
       <p:ext uri="{BB962C8B-B14F-4D97-AF65-F5344CB8AC3E}">
-        <p14:creationId xmlns:p14="http://schemas.microsoft.com/office/powerpoint/2010/main" val="966003729"/>
+        <p14:creationId xmlns:p14="http://schemas.microsoft.com/office/powerpoint/2010/main" val="114286306"/>
       </p:ext>
     </p:extLst>
   </p:cSld>
@@ -1303,53 +1238,7 @@
             </a:pPr>
             <a:r>
               <a:rPr lang="en-GB" dirty="0"/>
-              <a:t>While it would be preferable to prove correctness of arbitrary DSLs, this is generally impossible.</a:t>
-            </a:r>
-          </a:p>
-          <a:p>
-            <a:pPr marL="171450" indent="-171450">
-              <a:buFontTx/>
-              <a:buChar char="-"/>
-            </a:pPr>
-            <a:r>
-              <a:rPr lang="en-GB" dirty="0"/>
-              <a:t>As a result, research into formal verification focused on the duality of data and </a:t>
-            </a:r>
-            <a:r>
-              <a:rPr lang="en-GB" dirty="0" err="1"/>
-              <a:t>codata</a:t>
-            </a:r>
-            <a:r>
-              <a:rPr lang="en-GB" dirty="0"/>
-              <a:t>.</a:t>
-            </a:r>
-          </a:p>
-          <a:p>
-            <a:pPr marL="171450" indent="-171450">
-              <a:buFontTx/>
-              <a:buChar char="-"/>
-            </a:pPr>
-            <a:r>
-              <a:rPr lang="en-GB" dirty="0"/>
-              <a:t>Data is captured in inductive data types, that can be constructed in a finite number of steps. </a:t>
-            </a:r>
-          </a:p>
-          <a:p>
-            <a:pPr marL="171450" indent="-171450">
-              <a:buFontTx/>
-              <a:buChar char="-"/>
-            </a:pPr>
-            <a:r>
-              <a:rPr lang="en-GB" dirty="0"/>
-              <a:t>Research by Ralph </a:t>
-            </a:r>
-            <a:r>
-              <a:rPr lang="en-GB" dirty="0" err="1"/>
-              <a:t>Hinze</a:t>
-            </a:r>
-            <a:r>
-              <a:rPr lang="en-GB" dirty="0"/>
-              <a:t> shows that it is possible, in general, to prove well-founded recursive programs correct, and hence this is the restriction that the project uses. This ability to prove termination for well-founded general recursion enables the power of the metalanguage in this project.</a:t>
+              <a:t>This project has been heavily influenced by related literature, so I feel that a brief overview of the material is necessary.</a:t>
             </a:r>
           </a:p>
           <a:p>
@@ -1366,15 +1255,7 @@
             </a:pPr>
             <a:r>
               <a:rPr lang="en-GB" dirty="0"/>
-              <a:t>Barring special-case program semantics for function calls and special features (which are guaranteed to terminate through independent proof), </a:t>
-            </a:r>
-            <a:r>
-              <a:rPr lang="en-GB" dirty="0" err="1"/>
-              <a:t>Nordstom</a:t>
-            </a:r>
-            <a:r>
-              <a:rPr lang="en-GB" dirty="0"/>
-              <a:t> shows that big-step semantics can be reasoned about through well-founded induction.</a:t>
+              <a:t>While many uses of a DSL could be replaced by a GPL, proponents of DSLs find that the provide a “more appropriate level of abstraction” for a given problem domain.</a:t>
             </a:r>
           </a:p>
           <a:p>
@@ -1384,17 +1265,7 @@
             </a:pPr>
             <a:r>
               <a:rPr lang="en-GB" dirty="0"/>
-              <a:t>If a restriction is placed on the form of the semantics such that the convergence hypothesis for the semantics depends purely on the sub-terms of the semantics, then it follows that a language terminates as long as each base-case terminates.</a:t>
-            </a:r>
-          </a:p>
-          <a:p>
-            <a:pPr marL="171450" indent="-171450">
-              <a:buFontTx/>
-              <a:buChar char="-"/>
-            </a:pPr>
-            <a:r>
-              <a:rPr lang="en-GB" dirty="0"/>
-              <a:t>To this end, the language focuses on providing trivially terminating base-cases for the semantics, and recursively decomposing more complex semantics until, by the inductive hypothesis, they can be shown to terminate.</a:t>
+              <a:t>This is because they allow for encoding domain logic that may be orthogonal to the business software itself. </a:t>
             </a:r>
           </a:p>
           <a:p>
@@ -1411,7 +1282,7 @@
             </a:pPr>
             <a:r>
               <a:rPr lang="en-GB" dirty="0"/>
-              <a:t>Finally, research was conducted regarding the automatic generation of compilers, given the syntax and semantics of a language.</a:t>
+              <a:t>There are many kinds of DSLs in use, and these range from static specification to executable programs; this project, however, focuses on executable DSLs.</a:t>
             </a:r>
           </a:p>
           <a:p>
@@ -1421,7 +1292,7 @@
             </a:pPr>
             <a:r>
               <a:rPr lang="en-GB" dirty="0"/>
-              <a:t>Multiple benefits were found attributed to the approach aimed to be taken by the project, especially surrounding correctness, maintainability and portability in a study by Diehl.</a:t>
+              <a:t>Furthermore, it focuses on what the literature terms as ‘external’ DSLs: those which integrate with the GPL via a foreign function interface.</a:t>
             </a:r>
           </a:p>
           <a:p>
@@ -1431,7 +1302,99 @@
             </a:pPr>
             <a:r>
               <a:rPr lang="en-GB" dirty="0"/>
-              <a:t>While multiple intermediate representations for this transformation were explored, including LLVM and C--, it was found that generating the target compiler directly in a high-level language would make the task manageable in the project timescale. </a:t>
+              <a:t>This is because it allows maximum control over the DSL’s execution semantics.</a:t>
+            </a:r>
+          </a:p>
+          <a:p>
+            <a:pPr marL="171450" indent="-171450">
+              <a:buFontTx/>
+              <a:buChar char="-"/>
+            </a:pPr>
+            <a:r>
+              <a:rPr lang="en-GB" dirty="0"/>
+              <a:t>Furthermore, the DSL will be generated via compilation to Haskell, a process that transforms one high-level language into another known as </a:t>
+            </a:r>
+            <a:r>
+              <a:rPr lang="en-GB" dirty="0" err="1"/>
+              <a:t>Transpilation</a:t>
+            </a:r>
+            <a:r>
+              <a:rPr lang="en-GB" dirty="0"/>
+              <a:t>.</a:t>
+            </a:r>
+          </a:p>
+          <a:p>
+            <a:pPr marL="171450" indent="-171450">
+              <a:buFontTx/>
+              <a:buChar char="-"/>
+            </a:pPr>
+            <a:endParaRPr lang="en-GB" dirty="0"/>
+          </a:p>
+          <a:p>
+            <a:pPr marL="171450" indent="-171450">
+              <a:buFontTx/>
+              <a:buChar char="-"/>
+            </a:pPr>
+            <a:r>
+              <a:rPr lang="en-GB" dirty="0"/>
+              <a:t>Metalanguages are languages used to describe other languages, so research was conducted into methods for specifying both syntax and semantics. </a:t>
+            </a:r>
+          </a:p>
+          <a:p>
+            <a:pPr marL="171450" indent="-171450">
+              <a:buFontTx/>
+              <a:buChar char="-"/>
+            </a:pPr>
+            <a:r>
+              <a:rPr lang="en-GB" dirty="0"/>
+              <a:t>While there are many kinds of language grammars, the focus was placed on Extended Backus-Naur form, as it provides multiple extension mechanisms for integration additional language features. </a:t>
+            </a:r>
+          </a:p>
+          <a:p>
+            <a:pPr marL="171450" indent="-171450">
+              <a:buFontTx/>
+              <a:buChar char="-"/>
+            </a:pPr>
+            <a:endParaRPr lang="en-GB" dirty="0"/>
+          </a:p>
+          <a:p>
+            <a:pPr marL="171450" indent="-171450">
+              <a:buFontTx/>
+              <a:buChar char="-"/>
+            </a:pPr>
+            <a:r>
+              <a:rPr lang="en-GB" dirty="0"/>
+              <a:t>While there is a well-established standard for syntax specification, semantics is a much broader category of work.</a:t>
+            </a:r>
+          </a:p>
+          <a:p>
+            <a:pPr marL="171450" indent="-171450">
+              <a:buFontTx/>
+              <a:buChar char="-"/>
+            </a:pPr>
+            <a:r>
+              <a:rPr lang="en-GB" dirty="0"/>
+              <a:t>All types of semantics, however, consist of semantic functions: mappings from a program’s abstract syntax to its behaviour.</a:t>
+            </a:r>
+          </a:p>
+          <a:p>
+            <a:pPr marL="171450" indent="-171450">
+              <a:buFontTx/>
+              <a:buChar char="-"/>
+            </a:pPr>
+            <a:r>
+              <a:rPr lang="en-GB" dirty="0"/>
+              <a:t>While the review examined operational, denotational, axiomatic and hybrid semantics, it was decided to use big-step operational semantics.</a:t>
+            </a:r>
+          </a:p>
+          <a:p>
+            <a:pPr marL="171450" indent="-171450">
+              <a:buFontTx/>
+              <a:buChar char="-"/>
+            </a:pPr>
+            <a:r>
+              <a:rPr lang="en-GB" dirty="0"/>
+              <a:t>This provided the best balance between conciseness and expression, as well as the recursive structure required for the proof engine. </a:t>
             </a:r>
           </a:p>
         </p:txBody>
@@ -1453,7 +1416,7 @@
           <a:p>
             <a:fld id="{F5F7E2F0-36DF-4539-BA6A-BB9F44EE2545}" type="slidenum">
               <a:rPr lang="en-GB" smtClean="0"/>
-              <a:t>5</a:t>
+              <a:t>4</a:t>
             </a:fld>
             <a:endParaRPr lang="en-GB"/>
           </a:p>
@@ -1462,7 +1425,7 @@
     </p:spTree>
     <p:extLst>
       <p:ext uri="{BB962C8B-B14F-4D97-AF65-F5344CB8AC3E}">
-        <p14:creationId xmlns:p14="http://schemas.microsoft.com/office/powerpoint/2010/main" val="210789719"/>
+        <p14:creationId xmlns:p14="http://schemas.microsoft.com/office/powerpoint/2010/main" val="966003729"/>
       </p:ext>
     </p:extLst>
   </p:cSld>
@@ -1522,7 +1485,7 @@
             </a:pPr>
             <a:r>
               <a:rPr lang="en-GB" dirty="0"/>
-              <a:t>As you can probably already see, this project involves multiple levels of ‘meta’. </a:t>
+              <a:t>While it would be preferable to prove the correctness of arbitrary DSLs, this is generally impossible.</a:t>
             </a:r>
           </a:p>
           <a:p>
@@ -1532,7 +1495,45 @@
             </a:pPr>
             <a:r>
               <a:rPr lang="en-GB" dirty="0"/>
-              <a:t>It’s a bit brain-twisty.</a:t>
+              <a:t>As a result, research into program verification focused on the duality of data and </a:t>
+            </a:r>
+            <a:r>
+              <a:rPr lang="en-GB" dirty="0" err="1"/>
+              <a:t>codata</a:t>
+            </a:r>
+            <a:r>
+              <a:rPr lang="en-GB" dirty="0"/>
+              <a:t>.</a:t>
+            </a:r>
+          </a:p>
+          <a:p>
+            <a:pPr marL="171450" indent="-171450">
+              <a:buFontTx/>
+              <a:buChar char="-"/>
+            </a:pPr>
+            <a:r>
+              <a:rPr lang="en-GB" dirty="0"/>
+              <a:t>Data is captured by inductive data types, and can hence be constructed in a finite number of steps.</a:t>
+            </a:r>
+          </a:p>
+          <a:p>
+            <a:pPr marL="171450" indent="-171450">
+              <a:buFontTx/>
+              <a:buChar char="-"/>
+            </a:pPr>
+            <a:r>
+              <a:rPr lang="en-GB" dirty="0"/>
+              <a:t>It has been shown, generally, that it is possible to prove programs that use well-founded general recursion to be correct.</a:t>
+            </a:r>
+          </a:p>
+          <a:p>
+            <a:pPr marL="171450" indent="-171450">
+              <a:buFontTx/>
+              <a:buChar char="-"/>
+            </a:pPr>
+            <a:r>
+              <a:rPr lang="en-GB" dirty="0"/>
+              <a:t>By restricting programs to this, the project allows for the creation of powerful DSLs. </a:t>
             </a:r>
           </a:p>
           <a:p>
@@ -1549,27 +1550,110 @@
             </a:pPr>
             <a:r>
               <a:rPr lang="en-GB" dirty="0"/>
-              <a:t>There are two main elements of the project that have seen progress so far.</a:t>
-            </a:r>
-          </a:p>
-          <a:p>
-            <a:pPr marL="628650" lvl="1" indent="-171450">
+              <a:t>The general termination proof for the DSLs comes from Nordstrom, who shows that big-step semantics can be reasoned about through induction. </a:t>
+            </a:r>
+          </a:p>
+          <a:p>
+            <a:pPr marL="171450" indent="-171450">
               <a:buFontTx/>
               <a:buChar char="-"/>
             </a:pPr>
             <a:r>
               <a:rPr lang="en-GB" dirty="0"/>
-              <a:t>The metalanguage, that specifies the DSL</a:t>
-            </a:r>
-          </a:p>
-          <a:p>
-            <a:pPr marL="628650" lvl="1" indent="-171450">
+              <a:t>While there are special-case proofs for other language features, this inductive proof operates on the structure of the semantics. </a:t>
+            </a:r>
+          </a:p>
+          <a:p>
+            <a:pPr marL="171450" indent="-171450">
               <a:buFontTx/>
               <a:buChar char="-"/>
             </a:pPr>
             <a:r>
               <a:rPr lang="en-GB" dirty="0"/>
-              <a:t>The metacompiler, which verifies the DSL and generates a compiler for it</a:t>
+              <a:t>The aforementioned restrictions are placed on the form of the semantics such that the convergence hypothesis for the semantics depends </a:t>
+            </a:r>
+            <a:r>
+              <a:rPr lang="en-GB" i="1" dirty="0"/>
+              <a:t>purely</a:t>
+            </a:r>
+            <a:r>
+              <a:rPr lang="en-GB" i="0" dirty="0"/>
+              <a:t> on the sub-terms of the semantics. </a:t>
+            </a:r>
+          </a:p>
+          <a:p>
+            <a:pPr marL="171450" indent="-171450">
+              <a:buFontTx/>
+              <a:buChar char="-"/>
+            </a:pPr>
+            <a:r>
+              <a:rPr lang="en-GB" i="0" dirty="0"/>
+              <a:t>The metalanguage provides the ability to specify trivial base-cases for the semantics, and the proof engine recursively decomposes more complex semantics until they can be shown to terminate. </a:t>
+            </a:r>
+            <a:endParaRPr lang="en-GB" dirty="0"/>
+          </a:p>
+          <a:p>
+            <a:pPr marL="171450" indent="-171450">
+              <a:buFontTx/>
+              <a:buChar char="-"/>
+            </a:pPr>
+            <a:endParaRPr lang="en-GB" dirty="0"/>
+          </a:p>
+          <a:p>
+            <a:pPr marL="171450" indent="-171450">
+              <a:buFontTx/>
+              <a:buChar char="-"/>
+            </a:pPr>
+            <a:r>
+              <a:rPr lang="en-GB" dirty="0"/>
+              <a:t>Finally, there has been some work on the automated generation of compilers given syntax and semantics. </a:t>
+            </a:r>
+          </a:p>
+          <a:p>
+            <a:pPr marL="171450" indent="-171450">
+              <a:buFontTx/>
+              <a:buChar char="-"/>
+            </a:pPr>
+            <a:r>
+              <a:rPr lang="en-GB" dirty="0"/>
+              <a:t>It is found to offer benefits around correctness, maintainability and portability in study by Diehl, and so the project avoided the use of more complex intermediate representations, instead generating the target directly in a high-level language. </a:t>
+            </a:r>
+          </a:p>
+          <a:p>
+            <a:pPr marL="171450" indent="-171450">
+              <a:buFontTx/>
+              <a:buChar char="-"/>
+            </a:pPr>
+            <a:endParaRPr lang="en-GB" dirty="0"/>
+          </a:p>
+          <a:p>
+            <a:pPr marL="171450" indent="-171450">
+              <a:buFontTx/>
+              <a:buChar char="-"/>
+            </a:pPr>
+            <a:r>
+              <a:rPr lang="en-GB" dirty="0"/>
+              <a:t>Finally, research was conducted regarding the automatic generation of compilers, given the syntax and semantics of a language.</a:t>
+            </a:r>
+          </a:p>
+          <a:p>
+            <a:pPr marL="171450" indent="-171450">
+              <a:buFontTx/>
+              <a:buChar char="-"/>
+            </a:pPr>
+            <a:r>
+              <a:rPr lang="en-GB" dirty="0"/>
+              <a:t>Multiple benefits were found attributed to the approach aimed to be taken by the project, especially surrounding correctness, maintainability and portability in a study by Diehl.</a:t>
+            </a:r>
+          </a:p>
+          <a:p>
+            <a:pPr marL="171450" indent="-171450">
+              <a:buFontTx/>
+              <a:buChar char="-"/>
+            </a:pPr>
+            <a:r>
+              <a:rPr lang="en-GB" dirty="0"/>
+              <a:t>While multiple intermediate representations for this transformation were explored, including LLVM and C--, it was found that generating the target compiler directly in a high-level language would make the task manageable in the project timescale. </a:t>
             </a:r>
           </a:p>
         </p:txBody>
@@ -1591,7 +1675,7 @@
           <a:p>
             <a:fld id="{F5F7E2F0-36DF-4539-BA6A-BB9F44EE2545}" type="slidenum">
               <a:rPr lang="en-GB" smtClean="0"/>
-              <a:t>6</a:t>
+              <a:t>5</a:t>
             </a:fld>
             <a:endParaRPr lang="en-GB"/>
           </a:p>
@@ -1600,7 +1684,7 @@
     </p:spTree>
     <p:extLst>
       <p:ext uri="{BB962C8B-B14F-4D97-AF65-F5344CB8AC3E}">
-        <p14:creationId xmlns:p14="http://schemas.microsoft.com/office/powerpoint/2010/main" val="2982570423"/>
+        <p14:creationId xmlns:p14="http://schemas.microsoft.com/office/powerpoint/2010/main" val="210789719"/>
       </p:ext>
     </p:extLst>
   </p:cSld>
@@ -1660,15 +1744,7 @@
             </a:pPr>
             <a:r>
               <a:rPr lang="en-GB" dirty="0"/>
-              <a:t>Work on the metalanguage started by sketching how the </a:t>
-            </a:r>
-            <a:r>
-              <a:rPr lang="en-GB" dirty="0" err="1"/>
-              <a:t>metaspec</a:t>
-            </a:r>
-            <a:r>
-              <a:rPr lang="en-GB" dirty="0"/>
-              <a:t> syntax was supposed to look. </a:t>
+              <a:t>As you can probably already see, this project involves multiple levels of ‘meta’. </a:t>
             </a:r>
           </a:p>
           <a:p>
@@ -1678,7 +1754,7 @@
             </a:pPr>
             <a:r>
               <a:rPr lang="en-GB" dirty="0"/>
-              <a:t>Much care was taken in designing this syntax, ensuring that it supported the correct language features.</a:t>
+              <a:t>It’s a bit brain-twisty.</a:t>
             </a:r>
           </a:p>
           <a:p>
@@ -1688,7 +1764,7 @@
             </a:pPr>
             <a:r>
               <a:rPr lang="en-GB" dirty="0"/>
-              <a:t>This ensured that it was versatile enough to specify the operations required for a variety of different DSLs.</a:t>
+              <a:t>There are two main elements of the project that have seen progress so far.</a:t>
             </a:r>
           </a:p>
           <a:p>
@@ -1696,10 +1772,7 @@
               <a:buFontTx/>
               <a:buChar char="-"/>
             </a:pPr>
-            <a:r>
-              <a:rPr lang="en-GB" dirty="0"/>
-              <a:t>These included:</a:t>
-            </a:r>
+            <a:endParaRPr lang="en-GB" dirty="0"/>
           </a:p>
           <a:p>
             <a:pPr marL="628650" lvl="1" indent="-171450">
@@ -1708,7 +1781,7 @@
             </a:pPr>
             <a:r>
               <a:rPr lang="en-GB" dirty="0"/>
-              <a:t>Careful examination of how to best specify the big-step operational semantics in a textual format. While the solution to this was arrived on fairly quickly, it went through several iterations over time, adding the ability to restrict evaluation on the result of sub-evaluations, and specify how the evaluated result is produced. </a:t>
+              <a:t>The metalanguage, that specifies the DSL</a:t>
             </a:r>
           </a:p>
           <a:p>
@@ -1716,10 +1789,7 @@
               <a:buFontTx/>
               <a:buChar char="-"/>
             </a:pPr>
-            <a:r>
-              <a:rPr lang="en-GB" dirty="0"/>
-              <a:t>Determining the allowable semantic operations: The language restricts the operations that can be applied as part of the semantics in order to make it reasonable to prove their correctness. </a:t>
-            </a:r>
+            <a:endParaRPr lang="en-GB" dirty="0"/>
           </a:p>
           <a:p>
             <a:pPr marL="628650" lvl="1" indent="-171450">
@@ -1728,118 +1798,7 @@
             </a:pPr>
             <a:r>
               <a:rPr lang="en-GB" dirty="0"/>
-              <a:t>Methods for accessing syntactic elements within the semantics: Use of an array-address-like syntax (draw on the board/point)</a:t>
-            </a:r>
-          </a:p>
-          <a:p>
-            <a:pPr marL="628650" lvl="1" indent="-171450">
-              <a:buFontTx/>
-              <a:buChar char="-"/>
-            </a:pPr>
-            <a:r>
-              <a:rPr lang="en-GB" dirty="0"/>
-              <a:t>Determining the typing discipline: The semantics can operate on a pre-defined set of types. This ensures that, even if the language is not-typed, that the semantics are well-specified.</a:t>
-            </a:r>
-          </a:p>
-          <a:p>
-            <a:pPr marL="628650" lvl="1" indent="-171450">
-              <a:buFontTx/>
-              <a:buChar char="-"/>
-            </a:pPr>
-            <a:r>
-              <a:rPr lang="en-GB" dirty="0"/>
-              <a:t>Determining extension mechanisms: Care was taken to provide the user with useful semantic features such as list traversal, function calls, and environment access through the special syntax system.</a:t>
-            </a:r>
-          </a:p>
-          <a:p>
-            <a:pPr marL="628650" lvl="1" indent="-171450">
-              <a:buFontTx/>
-              <a:buChar char="-"/>
-            </a:pPr>
-            <a:r>
-              <a:rPr lang="en-GB" dirty="0"/>
-              <a:t>Environment handling: Methods for storing and retrieving values in the program environment, allowing for proper operation of function definitions and calls, and also </a:t>
-            </a:r>
-            <a:r>
-              <a:rPr lang="en-GB" dirty="0" err="1"/>
-              <a:t>stateful</a:t>
-            </a:r>
-            <a:r>
-              <a:rPr lang="en-GB" dirty="0"/>
-              <a:t> computations.</a:t>
-            </a:r>
-          </a:p>
-          <a:p>
-            <a:pPr marL="628650" lvl="1" indent="-171450">
-              <a:buFontTx/>
-              <a:buChar char="-"/>
-            </a:pPr>
-            <a:r>
-              <a:rPr lang="en-GB" dirty="0"/>
-              <a:t>This system provided a number of special syntactic elements that have already been proven correct, allowing more complex language features to be implemented in a provably correct fashion.</a:t>
-            </a:r>
-          </a:p>
-          <a:p>
-            <a:pPr marL="171450" lvl="0" indent="-171450">
-              <a:buFontTx/>
-              <a:buChar char="-"/>
-            </a:pPr>
-            <a:r>
-              <a:rPr lang="en-GB" dirty="0"/>
-              <a:t>Once the sketch of the </a:t>
-            </a:r>
-            <a:r>
-              <a:rPr lang="en-GB" dirty="0" err="1"/>
-              <a:t>metaspec</a:t>
-            </a:r>
-            <a:r>
-              <a:rPr lang="en-GB" dirty="0"/>
-              <a:t> syntax was complete, time was taken in order to fully-specify the grammar of the metalanguage. </a:t>
-            </a:r>
-          </a:p>
-          <a:p>
-            <a:pPr marL="171450" lvl="0" indent="-171450">
-              <a:buFontTx/>
-              <a:buChar char="-"/>
-            </a:pPr>
-            <a:r>
-              <a:rPr lang="en-GB" dirty="0"/>
-              <a:t>Some initial frustration was found around the issue of left-recursive grammars, as transforming these would lead to a difficulty of expression in the metalanguage.</a:t>
-            </a:r>
-          </a:p>
-          <a:p>
-            <a:pPr marL="171450" lvl="0" indent="-171450">
-              <a:buFontTx/>
-              <a:buChar char="-"/>
-            </a:pPr>
-            <a:r>
-              <a:rPr lang="en-GB" dirty="0"/>
-              <a:t>In the end, it was decided to work around this by employing an infinite-lookahead parser, thus ensuring that the parsing process would not diverge.</a:t>
-            </a:r>
-          </a:p>
-          <a:p>
-            <a:pPr marL="171450" lvl="0" indent="-171450">
-              <a:buFontTx/>
-              <a:buChar char="-"/>
-            </a:pPr>
-            <a:endParaRPr lang="en-GB" dirty="0"/>
-          </a:p>
-          <a:p>
-            <a:pPr marL="171450" lvl="0" indent="-171450">
-              <a:buFontTx/>
-              <a:buChar char="-"/>
-            </a:pPr>
-            <a:r>
-              <a:rPr lang="en-GB" dirty="0"/>
-              <a:t>While the semantics of </a:t>
-            </a:r>
-            <a:r>
-              <a:rPr lang="en-GB" dirty="0" err="1"/>
-              <a:t>metaspec</a:t>
-            </a:r>
-            <a:r>
-              <a:rPr lang="en-GB" dirty="0"/>
-              <a:t> are not fully specified, this is intended to occur as the metacompiler is developed. </a:t>
+              <a:t>The metacompiler, which verifies the DSL and generates a compiler for it</a:t>
             </a:r>
           </a:p>
         </p:txBody>
@@ -1861,7 +1820,7 @@
           <a:p>
             <a:fld id="{F5F7E2F0-36DF-4539-BA6A-BB9F44EE2545}" type="slidenum">
               <a:rPr lang="en-GB" smtClean="0"/>
-              <a:t>7</a:t>
+              <a:t>6</a:t>
             </a:fld>
             <a:endParaRPr lang="en-GB"/>
           </a:p>
@@ -1870,7 +1829,7 @@
     </p:spTree>
     <p:extLst>
       <p:ext uri="{BB962C8B-B14F-4D97-AF65-F5344CB8AC3E}">
-        <p14:creationId xmlns:p14="http://schemas.microsoft.com/office/powerpoint/2010/main" val="2588568114"/>
+        <p14:creationId xmlns:p14="http://schemas.microsoft.com/office/powerpoint/2010/main" val="2982570423"/>
       </p:ext>
     </p:extLst>
   </p:cSld>
@@ -1930,7 +1889,15 @@
             </a:pPr>
             <a:r>
               <a:rPr lang="en-GB" dirty="0"/>
-              <a:t>The metacompiler is currently at a very rudimentary stage, and will be the main focus of the next stage of the development effort.</a:t>
+              <a:t>The initial design of </a:t>
+            </a:r>
+            <a:r>
+              <a:rPr lang="en-GB" dirty="0" err="1"/>
+              <a:t>metaspec</a:t>
+            </a:r>
+            <a:r>
+              <a:rPr lang="en-GB" dirty="0"/>
+              <a:t> emerged from a sketch of how the syntax was intended to look. </a:t>
             </a:r>
           </a:p>
           <a:p>
@@ -1940,41 +1907,7 @@
             </a:pPr>
             <a:r>
               <a:rPr lang="en-GB" dirty="0"/>
-              <a:t>It is currently capable of reading in a </a:t>
-            </a:r>
-            <a:r>
-              <a:rPr lang="en-GB" dirty="0" err="1"/>
-              <a:t>metaspec</a:t>
-            </a:r>
-            <a:r>
-              <a:rPr lang="en-GB" dirty="0"/>
-              <a:t> file, and </a:t>
-            </a:r>
-            <a:r>
-              <a:rPr lang="en-GB" dirty="0" err="1"/>
-              <a:t>lexing</a:t>
-            </a:r>
-            <a:r>
-              <a:rPr lang="en-GB" dirty="0"/>
-              <a:t> a portion of the </a:t>
-            </a:r>
-            <a:r>
-              <a:rPr lang="en-GB" dirty="0" err="1"/>
-              <a:t>metaspec</a:t>
-            </a:r>
-            <a:r>
-              <a:rPr lang="en-GB" dirty="0"/>
-              <a:t> grammar.</a:t>
-            </a:r>
-          </a:p>
-          <a:p>
-            <a:pPr marL="171450" indent="-171450">
-              <a:buFontTx/>
-              <a:buChar char="-"/>
-            </a:pPr>
-            <a:r>
-              <a:rPr lang="en-GB" dirty="0"/>
-              <a:t>This means that it is capable of producing valid token streams for the portion of the grammar which it supports, providing a platform on which to base the parser implementation.</a:t>
+              <a:t>Significant care was taken designing this syntax, with the major challenge revolving around how to effectively specify both syntax AND semantics in one place. </a:t>
             </a:r>
           </a:p>
           <a:p>
@@ -1991,76 +1924,156 @@
             </a:pPr>
             <a:r>
               <a:rPr lang="en-GB" dirty="0"/>
-              <a:t>The intended mode of operation for the metacompiler pipeline is as follows</a:t>
-            </a:r>
-          </a:p>
-          <a:p>
-            <a:pPr marL="685800" lvl="1" indent="-228600">
-              <a:buFont typeface="+mj-lt"/>
-              <a:buAutoNum type="arabicPeriod"/>
+              <a:t>Significant care was taken with the semantics, providing facilities for directly accessing the syntactic elements within the semantics, tying the two together in an intuitive fashion.</a:t>
+            </a:r>
+          </a:p>
+          <a:p>
+            <a:pPr marL="171450" indent="-171450">
+              <a:buFontTx/>
+              <a:buChar char="-"/>
             </a:pPr>
             <a:r>
               <a:rPr lang="en-GB" dirty="0"/>
-              <a:t>Lex and Parse </a:t>
+              <a:t>Being able to do this has taken some significant design work, ensuring that the semantics were flexible enough to support the creation of varied DSLs.</a:t>
+            </a:r>
+          </a:p>
+          <a:p>
+            <a:pPr marL="171450" indent="-171450">
+              <a:buFontTx/>
+              <a:buChar char="-"/>
+            </a:pPr>
+            <a:r>
+              <a:rPr lang="en-GB" dirty="0"/>
+              <a:t>As they exist today, the semantics support restrictions on evaluation by the results of sub-evaluations, and specifications of how the semantic result is produced. </a:t>
+            </a:r>
+          </a:p>
+          <a:p>
+            <a:pPr marL="171450" indent="-171450">
+              <a:buFontTx/>
+              <a:buChar char="-"/>
+            </a:pPr>
+            <a:endParaRPr lang="en-GB" dirty="0"/>
+          </a:p>
+          <a:p>
+            <a:pPr marL="171450" indent="-171450">
+              <a:buFontTx/>
+              <a:buChar char="-"/>
+            </a:pPr>
+            <a:r>
+              <a:rPr lang="en-GB" dirty="0"/>
+              <a:t>The </a:t>
             </a:r>
             <a:r>
               <a:rPr lang="en-GB" dirty="0" err="1"/>
-              <a:t>Metaspec</a:t>
-            </a:r>
-            <a:r>
-              <a:rPr lang="en-GB" dirty="0"/>
-              <a:t> File</a:t>
-            </a:r>
-          </a:p>
-          <a:p>
-            <a:pPr marL="685800" lvl="1" indent="-228600">
-              <a:buFont typeface="+mj-lt"/>
-              <a:buAutoNum type="arabicPeriod"/>
+              <a:t>metaspec</a:t>
+            </a:r>
+            <a:r>
+              <a:rPr lang="en-GB" dirty="0"/>
+              <a:t> grammar is now complete, and the resultant language has many features that are important for the project, including:</a:t>
+            </a:r>
+          </a:p>
+          <a:p>
+            <a:pPr marL="628650" lvl="1" indent="-171450">
+              <a:buFontTx/>
+              <a:buChar char="-"/>
             </a:pPr>
             <a:r>
               <a:rPr lang="en-GB" dirty="0"/>
-              <a:t>Verify input language semantics</a:t>
-            </a:r>
-          </a:p>
-          <a:p>
-            <a:pPr marL="685800" lvl="1" indent="-228600">
-              <a:buFont typeface="+mj-lt"/>
-              <a:buAutoNum type="arabicPeriod"/>
+              <a:t>A restricted set of allowable semantic operations, making it reasonable to prove semantic correctness.</a:t>
+            </a:r>
+          </a:p>
+          <a:p>
+            <a:pPr marL="628650" lvl="1" indent="-171450">
+              <a:buFontTx/>
+              <a:buChar char="-"/>
             </a:pPr>
             <a:r>
               <a:rPr lang="en-GB" dirty="0"/>
-              <a:t>Generate compiler code</a:t>
-            </a:r>
-          </a:p>
-          <a:p>
-            <a:pPr marL="685800" lvl="1" indent="-228600">
-              <a:buFont typeface="+mj-lt"/>
-              <a:buAutoNum type="arabicPeriod"/>
+              <a:t>A semantics-enforced typing discipline, freeing the DSL implementer from needing to deal with language types at a syntactic level. AND</a:t>
+            </a:r>
+          </a:p>
+          <a:p>
+            <a:pPr marL="628650" lvl="1" indent="-171450">
+              <a:buFontTx/>
+              <a:buChar char="-"/>
             </a:pPr>
             <a:r>
               <a:rPr lang="en-GB" dirty="0"/>
-              <a:t>Compile compiler</a:t>
-            </a:r>
-          </a:p>
-          <a:p>
-            <a:pPr marL="685800" lvl="1" indent="-228600">
-              <a:buFont typeface="+mj-lt"/>
-              <a:buAutoNum type="arabicPeriod"/>
+              <a:t>Extension syntax to provide useful features such as data traversal, function calls and environment access (for functions and </a:t>
+            </a:r>
+            <a:r>
+              <a:rPr lang="en-GB" dirty="0" err="1"/>
+              <a:t>stateful</a:t>
+            </a:r>
+            <a:r>
+              <a:rPr lang="en-GB" dirty="0"/>
+              <a:t> computation).</a:t>
+            </a:r>
+          </a:p>
+          <a:p>
+            <a:pPr marL="171450" indent="-171450">
+              <a:buFontTx/>
+              <a:buChar char="-"/>
             </a:pPr>
-            <a:r>
-              <a:rPr lang="en-GB" dirty="0"/>
-              <a:t>Run compiler on a DSL program.</a:t>
-            </a:r>
-          </a:p>
-          <a:p>
-            <a:pPr marL="685800" lvl="1" indent="-228600">
-              <a:buFont typeface="+mj-lt"/>
-              <a:buAutoNum type="arabicPeriod"/>
+            <a:endParaRPr lang="en-GB" dirty="0"/>
+          </a:p>
+          <a:p>
+            <a:pPr marL="171450" indent="-171450">
+              <a:buFontTx/>
+              <a:buChar char="-"/>
             </a:pPr>
             <a:r>
               <a:rPr lang="en-GB" dirty="0"/>
-              <a:t>Interface with the DSL program from a GPL</a:t>
-            </a:r>
+              <a:t>The resultant grammar caused some initial frustration as it is left-recursive, but it was decided to work around this through use of an infinite-lookahead parser to ensure the parsing process would not diverge.</a:t>
+            </a:r>
+          </a:p>
+          <a:p>
+            <a:pPr marL="171450" indent="-171450">
+              <a:buFontTx/>
+              <a:buChar char="-"/>
+            </a:pPr>
+            <a:r>
+              <a:rPr lang="en-GB" dirty="0"/>
+              <a:t>While it would have been possible to avoid left-recursion, it would have led to significant complications in the </a:t>
+            </a:r>
+            <a:r>
+              <a:rPr lang="en-GB" dirty="0" err="1"/>
+              <a:t>metasyntax</a:t>
+            </a:r>
+            <a:r>
+              <a:rPr lang="en-GB" dirty="0"/>
+              <a:t> for accessing syntactic primaries in the semantics.</a:t>
+            </a:r>
+          </a:p>
+          <a:p>
+            <a:pPr marL="171450" indent="-171450">
+              <a:buFontTx/>
+              <a:buChar char="-"/>
+            </a:pPr>
+            <a:endParaRPr lang="en-GB" dirty="0"/>
+          </a:p>
+          <a:p>
+            <a:pPr marL="171450" indent="-171450">
+              <a:buFontTx/>
+              <a:buChar char="-"/>
+            </a:pPr>
+            <a:r>
+              <a:rPr lang="en-GB" dirty="0"/>
+              <a:t>While the </a:t>
+            </a:r>
+            <a:r>
+              <a:rPr lang="en-GB" dirty="0" err="1"/>
+              <a:t>metaspec</a:t>
+            </a:r>
+            <a:r>
+              <a:rPr lang="en-GB" dirty="0"/>
+              <a:t> semantics aren’t entirely specified, this work will take place as the </a:t>
+            </a:r>
+            <a:r>
+              <a:rPr lang="en-GB"/>
+              <a:t>metacompiler evolves. </a:t>
+            </a:r>
+            <a:endParaRPr lang="en-GB" dirty="0"/>
           </a:p>
         </p:txBody>
       </p:sp>
@@ -2081,7 +2094,7 @@
           <a:p>
             <a:fld id="{F5F7E2F0-36DF-4539-BA6A-BB9F44EE2545}" type="slidenum">
               <a:rPr lang="en-GB" smtClean="0"/>
-              <a:t>8</a:t>
+              <a:t>7</a:t>
             </a:fld>
             <a:endParaRPr lang="en-GB"/>
           </a:p>
@@ -2090,7 +2103,7 @@
     </p:spTree>
     <p:extLst>
       <p:ext uri="{BB962C8B-B14F-4D97-AF65-F5344CB8AC3E}">
-        <p14:creationId xmlns:p14="http://schemas.microsoft.com/office/powerpoint/2010/main" val="785811304"/>
+        <p14:creationId xmlns:p14="http://schemas.microsoft.com/office/powerpoint/2010/main" val="2588568114"/>
       </p:ext>
     </p:extLst>
   </p:cSld>
@@ -2150,7 +2163,7 @@
             </a:pPr>
             <a:r>
               <a:rPr lang="en-GB" dirty="0"/>
-              <a:t>While the project has been proceeding fairly smoothly up to this point, there is still much work to be done!</a:t>
+              <a:t>The metacompiler is currently at a very rudimentary stage, and will be the main focus of the next stage of the development effort.</a:t>
             </a:r>
           </a:p>
           <a:p>
@@ -2158,117 +2171,259 @@
               <a:buFontTx/>
               <a:buChar char="-"/>
             </a:pPr>
-            <a:r>
-              <a:rPr lang="en-GB" dirty="0"/>
-              <a:t>The metacompiler pipeline has a number of stages to go:</a:t>
-            </a:r>
-          </a:p>
-          <a:p>
-            <a:pPr marL="628650" lvl="1" indent="-171450">
+            <a:endParaRPr lang="en-GB" dirty="0"/>
+          </a:p>
+          <a:p>
+            <a:pPr marL="171450" indent="-171450">
               <a:buFontTx/>
               <a:buChar char="-"/>
             </a:pPr>
             <a:r>
               <a:rPr lang="en-GB" dirty="0"/>
-              <a:t>The grammar used to generate the </a:t>
-            </a:r>
-            <a:r>
-              <a:rPr lang="en-GB" dirty="0" err="1"/>
-              <a:t>lexer</a:t>
-            </a:r>
-            <a:r>
-              <a:rPr lang="en-GB" dirty="0"/>
-              <a:t> needs to be finished, being manually translated from the EBNF grammar that provides the syntax of </a:t>
-            </a:r>
-            <a:r>
-              <a:rPr lang="en-GB" dirty="0" err="1"/>
-              <a:t>metaspec</a:t>
-            </a:r>
-            <a:r>
-              <a:rPr lang="en-GB" dirty="0"/>
-              <a:t>.</a:t>
-            </a:r>
-          </a:p>
-          <a:p>
-            <a:pPr marL="628650" lvl="1" indent="-171450">
-              <a:buFontTx/>
-              <a:buChar char="-"/>
-            </a:pPr>
-            <a:r>
-              <a:rPr lang="en-GB" dirty="0"/>
-              <a:t>Once the </a:t>
-            </a:r>
-            <a:r>
-              <a:rPr lang="en-GB" dirty="0" err="1"/>
-              <a:t>lexer</a:t>
-            </a:r>
-            <a:r>
-              <a:rPr lang="en-GB" dirty="0"/>
-              <a:t> is complete, the infinite-lookahead parser will be implemented, reading from the token-stream provided by the </a:t>
-            </a:r>
-            <a:r>
-              <a:rPr lang="en-GB" dirty="0" err="1"/>
-              <a:t>lexer</a:t>
-            </a:r>
-            <a:r>
-              <a:rPr lang="en-GB" dirty="0"/>
-              <a:t>.</a:t>
-            </a:r>
-          </a:p>
-          <a:p>
-            <a:pPr marL="628650" lvl="1" indent="-171450">
-              <a:buFontTx/>
-              <a:buChar char="-"/>
-            </a:pPr>
-            <a:r>
-              <a:rPr lang="en-GB" dirty="0"/>
-              <a:t>The parser will be able to generate an AST, which will be filtered to provide the relevant nodes to the semantic verification engine.</a:t>
-            </a:r>
-          </a:p>
-          <a:p>
-            <a:pPr marL="628650" lvl="1" indent="-171450">
-              <a:buFontTx/>
-              <a:buChar char="-"/>
-            </a:pPr>
-            <a:r>
-              <a:rPr lang="en-GB" dirty="0"/>
-              <a:t>This engine will implement the termination proof mechanism through induction on the structure of semantics, combined with the separately-proven special-feature semantics.</a:t>
-            </a:r>
-          </a:p>
-          <a:p>
-            <a:pPr marL="628650" lvl="1" indent="-171450">
-              <a:buFontTx/>
-              <a:buChar char="-"/>
-            </a:pPr>
-            <a:r>
-              <a:rPr lang="en-GB" dirty="0"/>
-              <a:t>This will allow the metacompiler to verify the semantic correctness of the input DSL.</a:t>
-            </a:r>
-          </a:p>
-          <a:p>
-            <a:pPr marL="628650" lvl="1" indent="-171450">
-              <a:buFontTx/>
-              <a:buChar char="-"/>
-            </a:pPr>
-            <a:r>
-              <a:rPr lang="en-GB" dirty="0"/>
-              <a:t>Once this verification is complete, the code-generation </a:t>
-            </a:r>
-            <a:r>
-              <a:rPr lang="en-GB" dirty="0" err="1"/>
-              <a:t>segement</a:t>
-            </a:r>
-            <a:r>
-              <a:rPr lang="en-GB" dirty="0"/>
-              <a:t> will be implemented, walking the AST and generating Haskell code from the semantics contained within it.</a:t>
-            </a:r>
-          </a:p>
-          <a:p>
-            <a:pPr marL="628650" lvl="1" indent="-171450">
+              <a:t>The program architecture is complete</a:t>
+            </a:r>
+          </a:p>
+          <a:p>
+            <a:pPr marL="171450" indent="-171450">
               <a:buFontTx/>
               <a:buChar char="-"/>
             </a:pPr>
             <a:endParaRPr lang="en-GB" dirty="0"/>
+          </a:p>
+          <a:p>
+            <a:pPr marL="171450" indent="-171450">
+              <a:buFontTx/>
+              <a:buChar char="-"/>
+            </a:pPr>
+            <a:r>
+              <a:rPr lang="en-GB" dirty="0"/>
+              <a:t>It is currently capable of reading in a </a:t>
+            </a:r>
+            <a:r>
+              <a:rPr lang="en-GB" dirty="0" err="1"/>
+              <a:t>metaspec</a:t>
+            </a:r>
+            <a:r>
+              <a:rPr lang="en-GB" dirty="0"/>
+              <a:t> file, and </a:t>
+            </a:r>
+            <a:r>
+              <a:rPr lang="en-GB" dirty="0" err="1"/>
+              <a:t>lexing</a:t>
+            </a:r>
+            <a:r>
+              <a:rPr lang="en-GB" dirty="0"/>
+              <a:t> a portion of the </a:t>
+            </a:r>
+            <a:r>
+              <a:rPr lang="en-GB" dirty="0" err="1"/>
+              <a:t>metaspec</a:t>
+            </a:r>
+            <a:r>
+              <a:rPr lang="en-GB" dirty="0"/>
+              <a:t> grammar, producing a valid token stream for the grammar sections it supports. </a:t>
+            </a:r>
+          </a:p>
+          <a:p>
+            <a:pPr marL="171450" indent="-171450">
+              <a:buFontTx/>
+              <a:buChar char="-"/>
+            </a:pPr>
+            <a:endParaRPr lang="en-GB" dirty="0"/>
+          </a:p>
+          <a:p>
+            <a:pPr marL="171450" indent="-171450">
+              <a:buFontTx/>
+              <a:buChar char="-"/>
+            </a:pPr>
+            <a:r>
+              <a:rPr lang="en-GB" dirty="0"/>
+              <a:t>The intended mode of operation for the metacompiler pipeline is as follows</a:t>
+            </a:r>
+          </a:p>
+          <a:p>
+            <a:pPr marL="685800" lvl="1" indent="-228600">
+              <a:buFont typeface="+mj-lt"/>
+              <a:buAutoNum type="arabicPeriod"/>
+            </a:pPr>
+            <a:r>
+              <a:rPr lang="en-GB" dirty="0"/>
+              <a:t>Lex and Parse </a:t>
+            </a:r>
+            <a:r>
+              <a:rPr lang="en-GB" dirty="0" err="1"/>
+              <a:t>Metaspec</a:t>
+            </a:r>
+            <a:r>
+              <a:rPr lang="en-GB" dirty="0"/>
+              <a:t> File: This will require finishing the grammar for the </a:t>
+            </a:r>
+            <a:r>
+              <a:rPr lang="en-GB" dirty="0" err="1"/>
+              <a:t>lexer</a:t>
+            </a:r>
+            <a:r>
+              <a:rPr lang="en-GB" dirty="0"/>
+              <a:t> and implementing the infinite-lookahead parser on the token-stream.</a:t>
+            </a:r>
+          </a:p>
+          <a:p>
+            <a:pPr marL="685800" lvl="1" indent="-228600">
+              <a:buFont typeface="+mj-lt"/>
+              <a:buAutoNum type="arabicPeriod"/>
+            </a:pPr>
+            <a:r>
+              <a:rPr lang="en-GB" dirty="0"/>
+              <a:t>Verify input language semantics on a subset of the AST through induction on the structure of the semantics.</a:t>
+            </a:r>
+          </a:p>
+          <a:p>
+            <a:pPr marL="685800" lvl="1" indent="-228600">
+              <a:buFont typeface="+mj-lt"/>
+              <a:buAutoNum type="arabicPeriod"/>
+            </a:pPr>
+            <a:r>
+              <a:rPr lang="en-GB" dirty="0"/>
+              <a:t>Once the language has been verified, the metacompiler will perform code generation of the DSL compiler, walking the AST and generating Haskell code from the semantics contained within it. </a:t>
+            </a:r>
+          </a:p>
+          <a:p>
+            <a:pPr marL="685800" lvl="1" indent="-228600">
+              <a:buFont typeface="+mj-lt"/>
+              <a:buAutoNum type="arabicPeriod"/>
+            </a:pPr>
+            <a:endParaRPr lang="en-GB" dirty="0"/>
+          </a:p>
+          <a:p>
+            <a:pPr marL="685800" lvl="1" indent="-228600">
+              <a:buFont typeface="+mj-lt"/>
+              <a:buAutoNum type="arabicPeriod"/>
+            </a:pPr>
+            <a:r>
+              <a:rPr lang="en-GB" dirty="0"/>
+              <a:t>Compile the DSL compiler</a:t>
+            </a:r>
+          </a:p>
+          <a:p>
+            <a:pPr marL="685800" lvl="1" indent="-228600">
+              <a:buFont typeface="+mj-lt"/>
+              <a:buAutoNum type="arabicPeriod"/>
+            </a:pPr>
+            <a:r>
+              <a:rPr lang="en-GB" dirty="0"/>
+              <a:t>Run compiler on a DSL program.</a:t>
+            </a:r>
+          </a:p>
+          <a:p>
+            <a:pPr marL="685800" lvl="1" indent="-228600">
+              <a:buFont typeface="+mj-lt"/>
+              <a:buAutoNum type="arabicPeriod"/>
+            </a:pPr>
+            <a:r>
+              <a:rPr lang="en-GB" dirty="0"/>
+              <a:t>Interface with the DSL program from a GPL.</a:t>
+            </a:r>
+          </a:p>
+        </p:txBody>
+      </p:sp>
+      <p:sp>
+        <p:nvSpPr>
+          <p:cNvPr id="4" name="Slide Number Placeholder 3"/>
+          <p:cNvSpPr>
+            <a:spLocks noGrp="1"/>
+          </p:cNvSpPr>
+          <p:nvPr>
+            <p:ph type="sldNum" sz="quarter" idx="10"/>
+          </p:nvPr>
+        </p:nvSpPr>
+        <p:spPr/>
+        <p:txBody>
+          <a:bodyPr/>
+          <a:lstStyle/>
+          <a:p>
+            <a:fld id="{F5F7E2F0-36DF-4539-BA6A-BB9F44EE2545}" type="slidenum">
+              <a:rPr lang="en-GB" smtClean="0"/>
+              <a:t>8</a:t>
+            </a:fld>
+            <a:endParaRPr lang="en-GB"/>
+          </a:p>
+        </p:txBody>
+      </p:sp>
+    </p:spTree>
+    <p:extLst>
+      <p:ext uri="{BB962C8B-B14F-4D97-AF65-F5344CB8AC3E}">
+        <p14:creationId xmlns:p14="http://schemas.microsoft.com/office/powerpoint/2010/main" val="785811304"/>
+      </p:ext>
+    </p:extLst>
+  </p:cSld>
+  <p:clrMapOvr>
+    <a:masterClrMapping/>
+  </p:clrMapOvr>
+</p:notes>
+</file>
+
+<file path=ppt/notesSlides/notesSlide9.xml><?xml version="1.0" encoding="utf-8"?>
+<p:notes xmlns:a="http://schemas.openxmlformats.org/drawingml/2006/main" xmlns:r="http://schemas.openxmlformats.org/officeDocument/2006/relationships" xmlns:p="http://schemas.openxmlformats.org/presentationml/2006/main">
+  <p:cSld>
+    <p:spTree>
+      <p:nvGrpSpPr>
+        <p:cNvPr id="1" name=""/>
+        <p:cNvGrpSpPr/>
+        <p:nvPr/>
+      </p:nvGrpSpPr>
+      <p:grpSpPr>
+        <a:xfrm>
+          <a:off x="0" y="0"/>
+          <a:ext cx="0" cy="0"/>
+          <a:chOff x="0" y="0"/>
+          <a:chExt cx="0" cy="0"/>
+        </a:xfrm>
+      </p:grpSpPr>
+      <p:sp>
+        <p:nvSpPr>
+          <p:cNvPr id="2" name="Slide Image Placeholder 1"/>
+          <p:cNvSpPr>
+            <a:spLocks noGrp="1" noRot="1" noChangeAspect="1"/>
+          </p:cNvSpPr>
+          <p:nvPr>
+            <p:ph type="sldImg"/>
+          </p:nvPr>
+        </p:nvSpPr>
+        <p:spPr/>
+      </p:sp>
+      <p:sp>
+        <p:nvSpPr>
+          <p:cNvPr id="3" name="Notes Placeholder 2"/>
+          <p:cNvSpPr>
+            <a:spLocks noGrp="1"/>
+          </p:cNvSpPr>
+          <p:nvPr>
+            <p:ph type="body" idx="1"/>
+          </p:nvPr>
+        </p:nvSpPr>
+        <p:spPr/>
+        <p:txBody>
+          <a:bodyPr/>
+          <a:lstStyle/>
+          <a:p>
+            <a:pPr marL="171450" indent="-171450">
+              <a:buFontTx/>
+              <a:buChar char="-"/>
+            </a:pPr>
+            <a:r>
+              <a:rPr lang="en-GB" dirty="0"/>
+              <a:t>While the project has been proceeding fairly smoothly up to this point, there is still much work to be done!</a:t>
+            </a:r>
+          </a:p>
+          <a:p>
+            <a:pPr marL="171450" indent="-171450">
+              <a:buFontTx/>
+              <a:buChar char="-"/>
+            </a:pPr>
+            <a:r>
+              <a:rPr lang="en-GB" dirty="0"/>
+              <a:t>The metacompiler pipeline has a number of stages still to be finished, as discussed on the previous slide.</a:t>
+            </a:r>
           </a:p>
           <a:p>
             <a:pPr marL="171450" lvl="0" indent="-171450">
@@ -2466,7 +2621,7 @@
           <a:p>
             <a:fld id="{D54AD2BF-E258-4BCB-8F85-1F7AF2A60FEF}" type="datetimeFigureOut">
               <a:rPr lang="en-GB" smtClean="0"/>
-              <a:t>13/02/2017</a:t>
+              <a:t>14/02/2017</a:t>
             </a:fld>
             <a:endParaRPr lang="en-GB"/>
           </a:p>
@@ -2698,7 +2853,7 @@
           <a:p>
             <a:fld id="{D54AD2BF-E258-4BCB-8F85-1F7AF2A60FEF}" type="datetimeFigureOut">
               <a:rPr lang="en-GB" smtClean="0"/>
-              <a:t>13/02/2017</a:t>
+              <a:t>14/02/2017</a:t>
             </a:fld>
             <a:endParaRPr lang="en-GB"/>
           </a:p>
@@ -2878,7 +3033,7 @@
           <a:p>
             <a:fld id="{D54AD2BF-E258-4BCB-8F85-1F7AF2A60FEF}" type="datetimeFigureOut">
               <a:rPr lang="en-GB" smtClean="0"/>
-              <a:t>13/02/2017</a:t>
+              <a:t>14/02/2017</a:t>
             </a:fld>
             <a:endParaRPr lang="en-GB"/>
           </a:p>
@@ -3053,7 +3208,7 @@
           <a:p>
             <a:fld id="{D54AD2BF-E258-4BCB-8F85-1F7AF2A60FEF}" type="datetimeFigureOut">
               <a:rPr lang="en-GB" smtClean="0"/>
-              <a:t>13/02/2017</a:t>
+              <a:t>14/02/2017</a:t>
             </a:fld>
             <a:endParaRPr lang="en-GB"/>
           </a:p>
@@ -3361,7 +3516,7 @@
           <a:p>
             <a:fld id="{D54AD2BF-E258-4BCB-8F85-1F7AF2A60FEF}" type="datetimeFigureOut">
               <a:rPr lang="en-GB" smtClean="0"/>
-              <a:t>13/02/2017</a:t>
+              <a:t>14/02/2017</a:t>
             </a:fld>
             <a:endParaRPr lang="en-GB"/>
           </a:p>
@@ -3593,7 +3748,7 @@
           <a:p>
             <a:fld id="{D54AD2BF-E258-4BCB-8F85-1F7AF2A60FEF}" type="datetimeFigureOut">
               <a:rPr lang="en-GB" smtClean="0"/>
-              <a:t>13/02/2017</a:t>
+              <a:t>14/02/2017</a:t>
             </a:fld>
             <a:endParaRPr lang="en-GB"/>
           </a:p>
@@ -3960,7 +4115,7 @@
           <a:p>
             <a:fld id="{D54AD2BF-E258-4BCB-8F85-1F7AF2A60FEF}" type="datetimeFigureOut">
               <a:rPr lang="en-GB" smtClean="0"/>
-              <a:t>13/02/2017</a:t>
+              <a:t>14/02/2017</a:t>
             </a:fld>
             <a:endParaRPr lang="en-GB"/>
           </a:p>
@@ -4078,7 +4233,7 @@
           <a:p>
             <a:fld id="{D54AD2BF-E258-4BCB-8F85-1F7AF2A60FEF}" type="datetimeFigureOut">
               <a:rPr lang="en-GB" smtClean="0"/>
-              <a:t>13/02/2017</a:t>
+              <a:t>14/02/2017</a:t>
             </a:fld>
             <a:endParaRPr lang="en-GB"/>
           </a:p>
@@ -4173,7 +4328,7 @@
           <a:p>
             <a:fld id="{D54AD2BF-E258-4BCB-8F85-1F7AF2A60FEF}" type="datetimeFigureOut">
               <a:rPr lang="en-GB" smtClean="0"/>
-              <a:t>13/02/2017</a:t>
+              <a:t>14/02/2017</a:t>
             </a:fld>
             <a:endParaRPr lang="en-GB"/>
           </a:p>
@@ -4450,7 +4605,7 @@
           <a:p>
             <a:fld id="{D54AD2BF-E258-4BCB-8F85-1F7AF2A60FEF}" type="datetimeFigureOut">
               <a:rPr lang="en-GB" smtClean="0"/>
-              <a:t>13/02/2017</a:t>
+              <a:t>14/02/2017</a:t>
             </a:fld>
             <a:endParaRPr lang="en-GB"/>
           </a:p>
@@ -4703,7 +4858,7 @@
           <a:p>
             <a:fld id="{D54AD2BF-E258-4BCB-8F85-1F7AF2A60FEF}" type="datetimeFigureOut">
               <a:rPr lang="en-GB" smtClean="0"/>
-              <a:t>13/02/2017</a:t>
+              <a:t>14/02/2017</a:t>
             </a:fld>
             <a:endParaRPr lang="en-GB"/>
           </a:p>
@@ -4916,7 +5071,7 @@
           <a:p>
             <a:fld id="{D54AD2BF-E258-4BCB-8F85-1F7AF2A60FEF}" type="datetimeFigureOut">
               <a:rPr lang="en-GB" smtClean="0"/>
-              <a:t>13/02/2017</a:t>
+              <a:t>14/02/2017</a:t>
             </a:fld>
             <a:endParaRPr lang="en-GB"/>
           </a:p>
@@ -5362,11 +5517,13 @@
           </a:xfrm>
         </p:spPr>
         <p:txBody>
-          <a:bodyPr/>
-          <a:lstStyle/>
-          <a:p>
-            <a:r>
-              <a:rPr lang="en-GB" dirty="0"/>
+          <a:bodyPr>
+            <a:normAutofit/>
+          </a:bodyPr>
+          <a:lstStyle/>
+          <a:p>
+            <a:r>
+              <a:rPr lang="en-GB" sz="2000" dirty="0"/>
               <a:t>Specification and Verification of Domain-Specific Languages Through Automated Compiler Generation in Haskell</a:t>
             </a:r>
           </a:p>
@@ -5616,7 +5773,7 @@
             <a:avLst/>
           </a:prstGeom>
           <a:blipFill dpi="0" rotWithShape="1">
-            <a:blip r:embed="rId2">
+            <a:blip r:embed="rId3">
               <a:alphaModFix amt="13000"/>
               <a:extLst>
                 <a:ext uri="{28A0092B-C50C-407E-A947-70E740481C1C}">
@@ -5738,27 +5895,7 @@
                   </a:schemeClr>
                 </a:solidFill>
               </a:rPr>
-              <a:t> (Yes, the project is named after a </a:t>
-            </a:r>
-            <a:r>
-              <a:rPr lang="en-GB" sz="2000" dirty="0" err="1">
-                <a:solidFill>
-                  <a:schemeClr val="bg1">
-                    <a:lumMod val="65000"/>
-                  </a:schemeClr>
-                </a:solidFill>
-              </a:rPr>
-              <a:t>Pokemon</a:t>
-            </a:r>
-            <a:r>
-              <a:rPr lang="en-GB" sz="2000" dirty="0">
-                <a:solidFill>
-                  <a:schemeClr val="bg1">
-                    <a:lumMod val="65000"/>
-                  </a:schemeClr>
-                </a:solidFill>
-              </a:rPr>
-              <a:t>)</a:t>
+              <a:t> (Yes, the project is named after a Pokémon)</a:t>
             </a:r>
           </a:p>
         </p:txBody>
@@ -7932,8 +8069,13 @@
           <a:p>
             <a:r>
               <a:rPr lang="en-GB" dirty="0"/>
-              <a:t>The Work So Far – The Metalanguage</a:t>
-            </a:r>
+              <a:t>The Work So Far – </a:t>
+            </a:r>
+            <a:r>
+              <a:rPr lang="en-GB" dirty="0" err="1"/>
+              <a:t>Metaspec</a:t>
+            </a:r>
+            <a:endParaRPr lang="en-GB" dirty="0"/>
           </a:p>
         </p:txBody>
       </p:sp>
@@ -7999,7 +8141,6 @@
               <a:rPr lang="en-GB" dirty="0"/>
               <a:t>complete</a:t>
             </a:r>
-            <a:endParaRPr lang="en-GB" dirty="0"/>
           </a:p>
         </p:txBody>
       </p:sp>
@@ -8057,6 +8198,82 @@
           <a:xfrm>
             <a:off x="816429" y="1680372"/>
             <a:ext cx="5325836" cy="2147362"/>
+          </a:xfrm>
+          <a:prstGeom prst="rect">
+            <a:avLst/>
+          </a:prstGeom>
+        </p:spPr>
+      </p:pic>
+      <p:sp>
+        <p:nvSpPr>
+          <p:cNvPr id="3" name="Rectangle 2"/>
+          <p:cNvSpPr/>
+          <p:nvPr/>
+        </p:nvSpPr>
+        <p:spPr>
+          <a:xfrm>
+            <a:off x="656897" y="2180897"/>
+            <a:ext cx="5659820" cy="1739462"/>
+          </a:xfrm>
+          <a:prstGeom prst="rect">
+            <a:avLst/>
+          </a:prstGeom>
+          <a:solidFill>
+            <a:schemeClr val="bg1"/>
+          </a:solidFill>
+          <a:ln>
+            <a:noFill/>
+          </a:ln>
+        </p:spPr>
+        <p:style>
+          <a:lnRef idx="2">
+            <a:schemeClr val="accent1">
+              <a:shade val="50000"/>
+            </a:schemeClr>
+          </a:lnRef>
+          <a:fillRef idx="1">
+            <a:schemeClr val="accent1"/>
+          </a:fillRef>
+          <a:effectRef idx="0">
+            <a:schemeClr val="accent1"/>
+          </a:effectRef>
+          <a:fontRef idx="minor">
+            <a:schemeClr val="lt1"/>
+          </a:fontRef>
+        </p:style>
+        <p:txBody>
+          <a:bodyPr rtlCol="0" anchor="ctr"/>
+          <a:lstStyle/>
+          <a:p>
+            <a:pPr algn="ctr"/>
+            <a:endParaRPr lang="en-GB"/>
+          </a:p>
+        </p:txBody>
+      </p:sp>
+      <p:pic>
+        <p:nvPicPr>
+          <p:cNvPr id="4" name="Picture 3"/>
+          <p:cNvPicPr>
+            <a:picLocks noChangeAspect="1"/>
+          </p:cNvPicPr>
+          <p:nvPr/>
+        </p:nvPicPr>
+        <p:blipFill>
+          <a:blip r:embed="rId5">
+            <a:extLst>
+              <a:ext uri="{28A0092B-C50C-407E-A947-70E740481C1C}">
+                <a14:useLocalDpi xmlns:a14="http://schemas.microsoft.com/office/drawing/2010/main" val="0"/>
+              </a:ext>
+            </a:extLst>
+          </a:blip>
+          <a:stretch>
+            <a:fillRect/>
+          </a:stretch>
+        </p:blipFill>
+        <p:spPr>
+          <a:xfrm>
+            <a:off x="1523999" y="2332779"/>
+            <a:ext cx="3787889" cy="1541267"/>
           </a:xfrm>
           <a:prstGeom prst="rect">
             <a:avLst/>
@@ -8127,6 +8344,60 @@
                                   </p:childTnLst>
                                 </p:cTn>
                               </p:par>
+                              <p:par>
+                                <p:cTn id="7" presetID="1" presetClass="exit" presetSubtype="0" fill="hold" nodeType="withEffect">
+                                  <p:stCondLst>
+                                    <p:cond delay="0"/>
+                                  </p:stCondLst>
+                                  <p:childTnLst>
+                                    <p:set>
+                                      <p:cBhvr>
+                                        <p:cTn id="8" dur="1" fill="hold">
+                                          <p:stCondLst>
+                                            <p:cond delay="0"/>
+                                          </p:stCondLst>
+                                        </p:cTn>
+                                        <p:tgtEl>
+                                          <p:spTgt spid="4"/>
+                                        </p:tgtEl>
+                                        <p:attrNameLst>
+                                          <p:attrName>style.visibility</p:attrName>
+                                        </p:attrNameLst>
+                                      </p:cBhvr>
+                                      <p:to>
+                                        <p:strVal val="hidden"/>
+                                      </p:to>
+                                    </p:set>
+                                  </p:childTnLst>
+                                </p:cTn>
+                              </p:par>
+                              <p:par>
+                                <p:cTn id="9" presetID="1" presetClass="exit" presetSubtype="0" fill="hold" grpId="0" nodeType="withEffect">
+                                  <p:stCondLst>
+                                    <p:cond delay="0"/>
+                                  </p:stCondLst>
+                                  <p:childTnLst>
+                                    <p:set>
+                                      <p:cBhvr>
+                                        <p:cTn id="10" dur="1" fill="hold">
+                                          <p:stCondLst>
+                                            <p:cond delay="0"/>
+                                          </p:stCondLst>
+                                        </p:cTn>
+                                        <p:tgtEl>
+                                          <p:spTgt spid="3"/>
+                                        </p:tgtEl>
+                                        <p:attrNameLst>
+                                          <p:attrName>style.visibility</p:attrName>
+                                        </p:attrNameLst>
+                                      </p:cBhvr>
+                                      <p:to>
+                                        <p:strVal val="hidden"/>
+                                      </p:to>
+                                    </p:set>
+                                  </p:childTnLst>
+                                </p:cTn>
+                              </p:par>
                             </p:childTnLst>
                           </p:cTn>
                         </p:par>
@@ -8134,26 +8405,26 @@
                     </p:cTn>
                   </p:par>
                   <p:par>
-                    <p:cTn id="7" fill="hold">
+                    <p:cTn id="11" fill="hold">
                       <p:stCondLst>
                         <p:cond delay="indefinite"/>
                       </p:stCondLst>
                       <p:childTnLst>
                         <p:par>
-                          <p:cTn id="8" fill="hold">
+                          <p:cTn id="12" fill="hold">
                             <p:stCondLst>
                               <p:cond delay="0"/>
                             </p:stCondLst>
                             <p:childTnLst>
                               <p:par>
-                                <p:cTn id="9" presetID="1" presetClass="entr" presetSubtype="0" fill="hold" nodeType="clickEffect">
+                                <p:cTn id="13" presetID="1" presetClass="entr" presetSubtype="0" fill="hold" nodeType="clickEffect">
                                   <p:stCondLst>
                                     <p:cond delay="0"/>
                                   </p:stCondLst>
                                   <p:childTnLst>
                                     <p:set>
                                       <p:cBhvr>
-                                        <p:cTn id="10" dur="1" fill="hold">
+                                        <p:cTn id="14" dur="1" fill="hold">
                                           <p:stCondLst>
                                             <p:cond delay="0"/>
                                           </p:stCondLst>
@@ -8177,52 +8448,7 @@
                                 </p:cTn>
                               </p:par>
                               <p:par>
-                                <p:cTn id="11" presetID="1" presetClass="entr" presetSubtype="0" fill="hold" nodeType="withEffect">
-                                  <p:stCondLst>
-                                    <p:cond delay="0"/>
-                                  </p:stCondLst>
-                                  <p:childTnLst>
-                                    <p:set>
-                                      <p:cBhvr>
-                                        <p:cTn id="12" dur="1" fill="hold">
-                                          <p:stCondLst>
-                                            <p:cond delay="0"/>
-                                          </p:stCondLst>
-                                        </p:cTn>
-                                        <p:tgtEl>
-                                          <p:spTgt spid="8"/>
-                                        </p:tgtEl>
-                                        <p:attrNameLst>
-                                          <p:attrName>style.visibility</p:attrName>
-                                        </p:attrNameLst>
-                                      </p:cBhvr>
-                                      <p:to>
-                                        <p:strVal val="visible"/>
-                                      </p:to>
-                                    </p:set>
-                                  </p:childTnLst>
-                                </p:cTn>
-                              </p:par>
-                            </p:childTnLst>
-                          </p:cTn>
-                        </p:par>
-                      </p:childTnLst>
-                    </p:cTn>
-                  </p:par>
-                  <p:par>
-                    <p:cTn id="13" fill="hold">
-                      <p:stCondLst>
-                        <p:cond delay="indefinite"/>
-                      </p:stCondLst>
-                      <p:childTnLst>
-                        <p:par>
-                          <p:cTn id="14" fill="hold">
-                            <p:stCondLst>
-                              <p:cond delay="0"/>
-                            </p:stCondLst>
-                            <p:childTnLst>
-                              <p:par>
-                                <p:cTn id="15" presetID="1" presetClass="entr" presetSubtype="0" fill="hold" nodeType="clickEffect">
+                                <p:cTn id="15" presetID="1" presetClass="entr" presetSubtype="0" fill="hold" nodeType="withEffect">
                                   <p:stCondLst>
                                     <p:cond delay="0"/>
                                   </p:stCondLst>
@@ -8235,11 +8461,7 @@
                                           </p:stCondLst>
                                         </p:cTn>
                                         <p:tgtEl>
-                                          <p:spTgt spid="6">
-                                            <p:txEl>
-                                              <p:pRg st="3" end="3"/>
-                                            </p:txEl>
-                                          </p:spTgt>
+                                          <p:spTgt spid="8"/>
                                         </p:tgtEl>
                                         <p:attrNameLst>
                                           <p:attrName>style.visibility</p:attrName>
@@ -8279,6 +8501,55 @@
                                     <p:set>
                                       <p:cBhvr>
                                         <p:cTn id="20" dur="1" fill="hold">
+                                          <p:stCondLst>
+                                            <p:cond delay="0"/>
+                                          </p:stCondLst>
+                                        </p:cTn>
+                                        <p:tgtEl>
+                                          <p:spTgt spid="6">
+                                            <p:txEl>
+                                              <p:pRg st="3" end="3"/>
+                                            </p:txEl>
+                                          </p:spTgt>
+                                        </p:tgtEl>
+                                        <p:attrNameLst>
+                                          <p:attrName>style.visibility</p:attrName>
+                                        </p:attrNameLst>
+                                      </p:cBhvr>
+                                      <p:to>
+                                        <p:strVal val="visible"/>
+                                      </p:to>
+                                    </p:set>
+                                  </p:childTnLst>
+                                </p:cTn>
+                              </p:par>
+                            </p:childTnLst>
+                          </p:cTn>
+                        </p:par>
+                      </p:childTnLst>
+                    </p:cTn>
+                  </p:par>
+                  <p:par>
+                    <p:cTn id="21" fill="hold">
+                      <p:stCondLst>
+                        <p:cond delay="indefinite"/>
+                      </p:stCondLst>
+                      <p:childTnLst>
+                        <p:par>
+                          <p:cTn id="22" fill="hold">
+                            <p:stCondLst>
+                              <p:cond delay="0"/>
+                            </p:stCondLst>
+                            <p:childTnLst>
+                              <p:par>
+                                <p:cTn id="23" presetID="1" presetClass="entr" presetSubtype="0" fill="hold" nodeType="clickEffect">
+                                  <p:stCondLst>
+                                    <p:cond delay="0"/>
+                                  </p:stCondLst>
+                                  <p:childTnLst>
+                                    <p:set>
+                                      <p:cBhvr>
+                                        <p:cTn id="24" dur="1" fill="hold">
                                           <p:stCondLst>
                                             <p:cond delay="0"/>
                                           </p:stCondLst>
@@ -8328,6 +8599,9 @@
         </p:cTn>
       </p:par>
     </p:tnLst>
+    <p:bldLst>
+      <p:bldP spid="3" grpId="0" animBg="1"/>
+    </p:bldLst>
   </p:timing>
 </p:sld>
 </file>
@@ -8371,7 +8645,7 @@
           <a:p>
             <a:r>
               <a:rPr lang="en-GB" dirty="0"/>
-              <a:t>The Work So Far – The Metacompiler</a:t>
+              <a:t>The Work So Far – ABSOL</a:t>
             </a:r>
           </a:p>
         </p:txBody>
@@ -8389,7 +8663,7 @@
         <p:spPr>
           <a:xfrm>
             <a:off x="838200" y="1814996"/>
-            <a:ext cx="9932647" cy="4351338"/>
+            <a:ext cx="5603499" cy="1710893"/>
           </a:xfrm>
         </p:spPr>
         <p:txBody>
@@ -9682,7 +9956,7 @@
                                 </p:cTn>
                               </p:par>
                               <p:par>
-                                <p:cTn id="31" presetID="1" presetClass="entr" presetSubtype="0" fill="hold" grpId="0" nodeType="withEffect">
+                                <p:cTn id="31" presetID="1" presetClass="entr" presetSubtype="0" fill="hold" nodeType="withEffect">
                                   <p:stCondLst>
                                     <p:cond delay="0"/>
                                   </p:stCondLst>
@@ -9695,7 +9969,7 @@
                                           </p:stCondLst>
                                         </p:cTn>
                                         <p:tgtEl>
-                                          <p:spTgt spid="17"/>
+                                          <p:spTgt spid="25"/>
                                         </p:tgtEl>
                                         <p:attrNameLst>
                                           <p:attrName>style.visibility</p:attrName>
@@ -9709,7 +9983,7 @@
                                 </p:cTn>
                               </p:par>
                               <p:par>
-                                <p:cTn id="33" presetID="1" presetClass="entr" presetSubtype="0" fill="hold" grpId="0" nodeType="withEffect">
+                                <p:cTn id="33" presetID="1" presetClass="entr" presetSubtype="0" fill="hold" nodeType="withEffect">
                                   <p:stCondLst>
                                     <p:cond delay="0"/>
                                   </p:stCondLst>
@@ -9722,7 +9996,7 @@
                                           </p:stCondLst>
                                         </p:cTn>
                                         <p:tgtEl>
-                                          <p:spTgt spid="18"/>
+                                          <p:spTgt spid="27"/>
                                         </p:tgtEl>
                                         <p:attrNameLst>
                                           <p:attrName>style.visibility</p:attrName>
@@ -9736,7 +10010,7 @@
                                 </p:cTn>
                               </p:par>
                               <p:par>
-                                <p:cTn id="35" presetID="1" presetClass="entr" presetSubtype="0" fill="hold" grpId="0" nodeType="withEffect">
+                                <p:cTn id="35" presetID="1" presetClass="entr" presetSubtype="0" fill="hold" nodeType="withEffect">
                                   <p:stCondLst>
                                     <p:cond delay="0"/>
                                   </p:stCondLst>
@@ -9749,7 +10023,7 @@
                                           </p:stCondLst>
                                         </p:cTn>
                                         <p:tgtEl>
-                                          <p:spTgt spid="19"/>
+                                          <p:spTgt spid="29"/>
                                         </p:tgtEl>
                                         <p:attrNameLst>
                                           <p:attrName>style.visibility</p:attrName>
@@ -9762,35 +10036,26 @@
                                   </p:childTnLst>
                                 </p:cTn>
                               </p:par>
+                            </p:childTnLst>
+                          </p:cTn>
+                        </p:par>
+                      </p:childTnLst>
+                    </p:cTn>
+                  </p:par>
+                  <p:par>
+                    <p:cTn id="37" fill="hold">
+                      <p:stCondLst>
+                        <p:cond delay="indefinite"/>
+                      </p:stCondLst>
+                      <p:childTnLst>
+                        <p:par>
+                          <p:cTn id="38" fill="hold">
+                            <p:stCondLst>
+                              <p:cond delay="0"/>
+                            </p:stCondLst>
+                            <p:childTnLst>
                               <p:par>
-                                <p:cTn id="37" presetID="1" presetClass="entr" presetSubtype="0" fill="hold" grpId="0" nodeType="withEffect">
-                                  <p:stCondLst>
-                                    <p:cond delay="0"/>
-                                  </p:stCondLst>
-                                  <p:childTnLst>
-                                    <p:set>
-                                      <p:cBhvr>
-                                        <p:cTn id="38" dur="1" fill="hold">
-                                          <p:stCondLst>
-                                            <p:cond delay="0"/>
-                                          </p:stCondLst>
-                                        </p:cTn>
-                                        <p:tgtEl>
-                                          <p:spTgt spid="20"/>
-                                        </p:tgtEl>
-                                        <p:attrNameLst>
-                                          <p:attrName>style.visibility</p:attrName>
-                                        </p:attrNameLst>
-                                      </p:cBhvr>
-                                      <p:to>
-                                        <p:strVal val="visible"/>
-                                      </p:to>
-                                    </p:set>
-                                  </p:childTnLst>
-                                </p:cTn>
-                              </p:par>
-                              <p:par>
-                                <p:cTn id="39" presetID="1" presetClass="entr" presetSubtype="0" fill="hold" grpId="0" nodeType="withEffect">
+                                <p:cTn id="39" presetID="1" presetClass="entr" presetSubtype="0" fill="hold" grpId="0" nodeType="clickEffect">
                                   <p:stCondLst>
                                     <p:cond delay="0"/>
                                   </p:stCondLst>
@@ -9803,7 +10068,7 @@
                                           </p:stCondLst>
                                         </p:cTn>
                                         <p:tgtEl>
-                                          <p:spTgt spid="21"/>
+                                          <p:spTgt spid="19"/>
                                         </p:tgtEl>
                                         <p:attrNameLst>
                                           <p:attrName>style.visibility</p:attrName>
@@ -9830,7 +10095,7 @@
                                           </p:stCondLst>
                                         </p:cTn>
                                         <p:tgtEl>
-                                          <p:spTgt spid="22"/>
+                                          <p:spTgt spid="20"/>
                                         </p:tgtEl>
                                         <p:attrNameLst>
                                           <p:attrName>style.visibility</p:attrName>
@@ -9857,7 +10122,7 @@
                                           </p:stCondLst>
                                         </p:cTn>
                                         <p:tgtEl>
-                                          <p:spTgt spid="23"/>
+                                          <p:spTgt spid="21"/>
                                         </p:tgtEl>
                                         <p:attrNameLst>
                                           <p:attrName>style.visibility</p:attrName>
@@ -9871,7 +10136,7 @@
                                 </p:cTn>
                               </p:par>
                               <p:par>
-                                <p:cTn id="45" presetID="1" presetClass="entr" presetSubtype="0" fill="hold" nodeType="withEffect">
+                                <p:cTn id="45" presetID="1" presetClass="entr" presetSubtype="0" fill="hold" grpId="0" nodeType="withEffect">
                                   <p:stCondLst>
                                     <p:cond delay="0"/>
                                   </p:stCondLst>
@@ -9884,7 +10149,7 @@
                                           </p:stCondLst>
                                         </p:cTn>
                                         <p:tgtEl>
-                                          <p:spTgt spid="25"/>
+                                          <p:spTgt spid="22"/>
                                         </p:tgtEl>
                                         <p:attrNameLst>
                                           <p:attrName>style.visibility</p:attrName>
@@ -9898,7 +10163,7 @@
                                 </p:cTn>
                               </p:par>
                               <p:par>
-                                <p:cTn id="47" presetID="1" presetClass="entr" presetSubtype="0" fill="hold" nodeType="withEffect">
+                                <p:cTn id="47" presetID="1" presetClass="entr" presetSubtype="0" fill="hold" grpId="0" nodeType="withEffect">
                                   <p:stCondLst>
                                     <p:cond delay="0"/>
                                   </p:stCondLst>
@@ -9911,7 +10176,7 @@
                                           </p:stCondLst>
                                         </p:cTn>
                                         <p:tgtEl>
-                                          <p:spTgt spid="27"/>
+                                          <p:spTgt spid="23"/>
                                         </p:tgtEl>
                                         <p:attrNameLst>
                                           <p:attrName>style.visibility</p:attrName>
@@ -9938,7 +10203,7 @@
                                           </p:stCondLst>
                                         </p:cTn>
                                         <p:tgtEl>
-                                          <p:spTgt spid="29"/>
+                                          <p:spTgt spid="31"/>
                                         </p:tgtEl>
                                         <p:attrNameLst>
                                           <p:attrName>style.visibility</p:attrName>
@@ -9965,7 +10230,52 @@
                                           </p:stCondLst>
                                         </p:cTn>
                                         <p:tgtEl>
-                                          <p:spTgt spid="31"/>
+                                          <p:spTgt spid="35"/>
+                                        </p:tgtEl>
+                                        <p:attrNameLst>
+                                          <p:attrName>style.visibility</p:attrName>
+                                        </p:attrNameLst>
+                                      </p:cBhvr>
+                                      <p:to>
+                                        <p:strVal val="visible"/>
+                                      </p:to>
+                                    </p:set>
+                                  </p:childTnLst>
+                                </p:cTn>
+                              </p:par>
+                            </p:childTnLst>
+                          </p:cTn>
+                        </p:par>
+                      </p:childTnLst>
+                    </p:cTn>
+                  </p:par>
+                  <p:par>
+                    <p:cTn id="53" fill="hold">
+                      <p:stCondLst>
+                        <p:cond delay="indefinite"/>
+                      </p:stCondLst>
+                      <p:childTnLst>
+                        <p:par>
+                          <p:cTn id="54" fill="hold">
+                            <p:stCondLst>
+                              <p:cond delay="0"/>
+                            </p:stCondLst>
+                            <p:childTnLst>
+                              <p:par>
+                                <p:cTn id="55" presetID="1" presetClass="entr" presetSubtype="0" fill="hold" grpId="0" nodeType="clickEffect">
+                                  <p:stCondLst>
+                                    <p:cond delay="0"/>
+                                  </p:stCondLst>
+                                  <p:childTnLst>
+                                    <p:set>
+                                      <p:cBhvr>
+                                        <p:cTn id="56" dur="1" fill="hold">
+                                          <p:stCondLst>
+                                            <p:cond delay="0"/>
+                                          </p:stCondLst>
+                                        </p:cTn>
+                                        <p:tgtEl>
+                                          <p:spTgt spid="17"/>
                                         </p:tgtEl>
                                         <p:attrNameLst>
                                           <p:attrName>style.visibility</p:attrName>
@@ -9979,20 +10289,20 @@
                                 </p:cTn>
                               </p:par>
                               <p:par>
-                                <p:cTn id="53" presetID="1" presetClass="entr" presetSubtype="0" fill="hold" nodeType="withEffect">
+                                <p:cTn id="57" presetID="1" presetClass="entr" presetSubtype="0" fill="hold" grpId="0" nodeType="withEffect">
                                   <p:stCondLst>
                                     <p:cond delay="0"/>
                                   </p:stCondLst>
                                   <p:childTnLst>
                                     <p:set>
                                       <p:cBhvr>
-                                        <p:cTn id="54" dur="1" fill="hold">
+                                        <p:cTn id="58" dur="1" fill="hold">
                                           <p:stCondLst>
                                             <p:cond delay="0"/>
                                           </p:stCondLst>
                                         </p:cTn>
                                         <p:tgtEl>
-                                          <p:spTgt spid="33"/>
+                                          <p:spTgt spid="18"/>
                                         </p:tgtEl>
                                         <p:attrNameLst>
                                           <p:attrName>style.visibility</p:attrName>
@@ -10006,20 +10316,20 @@
                                 </p:cTn>
                               </p:par>
                               <p:par>
-                                <p:cTn id="55" presetID="1" presetClass="entr" presetSubtype="0" fill="hold" nodeType="withEffect">
+                                <p:cTn id="59" presetID="1" presetClass="entr" presetSubtype="0" fill="hold" nodeType="withEffect">
                                   <p:stCondLst>
                                     <p:cond delay="0"/>
                                   </p:stCondLst>
                                   <p:childTnLst>
                                     <p:set>
                                       <p:cBhvr>
-                                        <p:cTn id="56" dur="1" fill="hold">
+                                        <p:cTn id="60" dur="1" fill="hold">
                                           <p:stCondLst>
                                             <p:cond delay="0"/>
                                           </p:stCondLst>
                                         </p:cTn>
                                         <p:tgtEl>
-                                          <p:spTgt spid="35"/>
+                                          <p:spTgt spid="33"/>
                                         </p:tgtEl>
                                         <p:attrNameLst>
                                           <p:attrName>style.visibility</p:attrName>
@@ -10137,50 +10447,17 @@
           <a:p>
             <a:r>
               <a:rPr lang="en-GB" dirty="0"/>
-              <a:t>Continue work on the metacompiler:</a:t>
-            </a:r>
-          </a:p>
-          <a:p>
-            <a:pPr lvl="1"/>
-            <a:r>
-              <a:rPr lang="en-GB" dirty="0"/>
-              <a:t>Complete the </a:t>
+              <a:t>Continue work on ABSOL</a:t>
+            </a:r>
+          </a:p>
+          <a:p>
+            <a:r>
+              <a:rPr lang="en-GB" dirty="0"/>
+              <a:t>Iteratively develop the semantics of </a:t>
             </a:r>
             <a:r>
               <a:rPr lang="en-GB" dirty="0" err="1"/>
-              <a:t>Lexer</a:t>
-            </a:r>
-            <a:endParaRPr lang="en-GB" dirty="0"/>
-          </a:p>
-          <a:p>
-            <a:pPr lvl="1"/>
-            <a:r>
-              <a:rPr lang="en-GB" dirty="0"/>
-              <a:t>Implement the Parser</a:t>
-            </a:r>
-          </a:p>
-          <a:p>
-            <a:pPr lvl="1"/>
-            <a:r>
-              <a:rPr lang="en-GB" dirty="0"/>
-              <a:t>Implement the termination proof mechanism</a:t>
-            </a:r>
-          </a:p>
-          <a:p>
-            <a:pPr lvl="1"/>
-            <a:r>
-              <a:rPr lang="en-GB" dirty="0"/>
-              <a:t>Implement the code generation</a:t>
-            </a:r>
-          </a:p>
-          <a:p>
-            <a:r>
-              <a:rPr lang="en-GB" dirty="0"/>
-              <a:t>Iteratively develop the semantics of </a:t>
-            </a:r>
-            <a:r>
-              <a:rPr lang="en-GB" dirty="0" err="1"/>
-              <a:t>metaspec</a:t>
+              <a:t>Metaspec</a:t>
             </a:r>
             <a:endParaRPr lang="en-GB" dirty="0"/>
           </a:p>
@@ -10236,202 +10513,6 @@
                                           <p:spTgt spid="3">
                                             <p:txEl>
                                               <p:pRg st="1" end="1"/>
-                                            </p:txEl>
-                                          </p:spTgt>
-                                        </p:tgtEl>
-                                        <p:attrNameLst>
-                                          <p:attrName>style.visibility</p:attrName>
-                                        </p:attrNameLst>
-                                      </p:cBhvr>
-                                      <p:to>
-                                        <p:strVal val="visible"/>
-                                      </p:to>
-                                    </p:set>
-                                  </p:childTnLst>
-                                </p:cTn>
-                              </p:par>
-                            </p:childTnLst>
-                          </p:cTn>
-                        </p:par>
-                      </p:childTnLst>
-                    </p:cTn>
-                  </p:par>
-                  <p:par>
-                    <p:cTn id="7" fill="hold">
-                      <p:stCondLst>
-                        <p:cond delay="indefinite"/>
-                      </p:stCondLst>
-                      <p:childTnLst>
-                        <p:par>
-                          <p:cTn id="8" fill="hold">
-                            <p:stCondLst>
-                              <p:cond delay="0"/>
-                            </p:stCondLst>
-                            <p:childTnLst>
-                              <p:par>
-                                <p:cTn id="9" presetID="1" presetClass="entr" presetSubtype="0" fill="hold" nodeType="clickEffect">
-                                  <p:stCondLst>
-                                    <p:cond delay="0"/>
-                                  </p:stCondLst>
-                                  <p:childTnLst>
-                                    <p:set>
-                                      <p:cBhvr>
-                                        <p:cTn id="10" dur="1" fill="hold">
-                                          <p:stCondLst>
-                                            <p:cond delay="0"/>
-                                          </p:stCondLst>
-                                        </p:cTn>
-                                        <p:tgtEl>
-                                          <p:spTgt spid="3">
-                                            <p:txEl>
-                                              <p:pRg st="2" end="2"/>
-                                            </p:txEl>
-                                          </p:spTgt>
-                                        </p:tgtEl>
-                                        <p:attrNameLst>
-                                          <p:attrName>style.visibility</p:attrName>
-                                        </p:attrNameLst>
-                                      </p:cBhvr>
-                                      <p:to>
-                                        <p:strVal val="visible"/>
-                                      </p:to>
-                                    </p:set>
-                                  </p:childTnLst>
-                                </p:cTn>
-                              </p:par>
-                            </p:childTnLst>
-                          </p:cTn>
-                        </p:par>
-                      </p:childTnLst>
-                    </p:cTn>
-                  </p:par>
-                  <p:par>
-                    <p:cTn id="11" fill="hold">
-                      <p:stCondLst>
-                        <p:cond delay="indefinite"/>
-                      </p:stCondLst>
-                      <p:childTnLst>
-                        <p:par>
-                          <p:cTn id="12" fill="hold">
-                            <p:stCondLst>
-                              <p:cond delay="0"/>
-                            </p:stCondLst>
-                            <p:childTnLst>
-                              <p:par>
-                                <p:cTn id="13" presetID="1" presetClass="entr" presetSubtype="0" fill="hold" nodeType="clickEffect">
-                                  <p:stCondLst>
-                                    <p:cond delay="0"/>
-                                  </p:stCondLst>
-                                  <p:childTnLst>
-                                    <p:set>
-                                      <p:cBhvr>
-                                        <p:cTn id="14" dur="1" fill="hold">
-                                          <p:stCondLst>
-                                            <p:cond delay="0"/>
-                                          </p:stCondLst>
-                                        </p:cTn>
-                                        <p:tgtEl>
-                                          <p:spTgt spid="3">
-                                            <p:txEl>
-                                              <p:pRg st="3" end="3"/>
-                                            </p:txEl>
-                                          </p:spTgt>
-                                        </p:tgtEl>
-                                        <p:attrNameLst>
-                                          <p:attrName>style.visibility</p:attrName>
-                                        </p:attrNameLst>
-                                      </p:cBhvr>
-                                      <p:to>
-                                        <p:strVal val="visible"/>
-                                      </p:to>
-                                    </p:set>
-                                  </p:childTnLst>
-                                </p:cTn>
-                              </p:par>
-                            </p:childTnLst>
-                          </p:cTn>
-                        </p:par>
-                      </p:childTnLst>
-                    </p:cTn>
-                  </p:par>
-                  <p:par>
-                    <p:cTn id="15" fill="hold">
-                      <p:stCondLst>
-                        <p:cond delay="indefinite"/>
-                      </p:stCondLst>
-                      <p:childTnLst>
-                        <p:par>
-                          <p:cTn id="16" fill="hold">
-                            <p:stCondLst>
-                              <p:cond delay="0"/>
-                            </p:stCondLst>
-                            <p:childTnLst>
-                              <p:par>
-                                <p:cTn id="17" presetID="1" presetClass="entr" presetSubtype="0" fill="hold" nodeType="clickEffect">
-                                  <p:stCondLst>
-                                    <p:cond delay="0"/>
-                                  </p:stCondLst>
-                                  <p:childTnLst>
-                                    <p:set>
-                                      <p:cBhvr>
-                                        <p:cTn id="18" dur="1" fill="hold">
-                                          <p:stCondLst>
-                                            <p:cond delay="0"/>
-                                          </p:stCondLst>
-                                        </p:cTn>
-                                        <p:tgtEl>
-                                          <p:spTgt spid="3">
-                                            <p:txEl>
-                                              <p:pRg st="4" end="4"/>
-                                            </p:txEl>
-                                          </p:spTgt>
-                                        </p:tgtEl>
-                                        <p:attrNameLst>
-                                          <p:attrName>style.visibility</p:attrName>
-                                        </p:attrNameLst>
-                                      </p:cBhvr>
-                                      <p:to>
-                                        <p:strVal val="visible"/>
-                                      </p:to>
-                                    </p:set>
-                                  </p:childTnLst>
-                                </p:cTn>
-                              </p:par>
-                            </p:childTnLst>
-                          </p:cTn>
-                        </p:par>
-                      </p:childTnLst>
-                    </p:cTn>
-                  </p:par>
-                  <p:par>
-                    <p:cTn id="19" fill="hold">
-                      <p:stCondLst>
-                        <p:cond delay="indefinite"/>
-                      </p:stCondLst>
-                      <p:childTnLst>
-                        <p:par>
-                          <p:cTn id="20" fill="hold">
-                            <p:stCondLst>
-                              <p:cond delay="0"/>
-                            </p:stCondLst>
-                            <p:childTnLst>
-                              <p:par>
-                                <p:cTn id="21" presetID="1" presetClass="entr" presetSubtype="0" fill="hold" nodeType="clickEffect">
-                                  <p:stCondLst>
-                                    <p:cond delay="0"/>
-                                  </p:stCondLst>
-                                  <p:childTnLst>
-                                    <p:set>
-                                      <p:cBhvr>
-                                        <p:cTn id="22" dur="1" fill="hold">
-                                          <p:stCondLst>
-                                            <p:cond delay="0"/>
-                                          </p:stCondLst>
-                                        </p:cTn>
-                                        <p:tgtEl>
-                                          <p:spTgt spid="3">
-                                            <p:txEl>
-                                              <p:pRg st="5" end="5"/>
                                             </p:txEl>
                                           </p:spTgt>
                                         </p:tgtEl>

</xml_diff>